<commit_message>
added ppt for TF_DRL
</commit_message>
<xml_diff>
--- a/01-topic-selection/topics/mouse-transfer-function/TransferfunctionRL.pptx
+++ b/01-topic-selection/topics/mouse-transfer-function/TransferfunctionRL.pptx
@@ -253,7 +253,7 @@
             <a:fld id="{350B7780-B50B-474C-85C6-0B4009B6F014}" type="datetimeFigureOut">
               <a:rPr lang="de-DE" smtClean="0"/>
               <a:pPr/>
-              <a:t>30.04.2019</a:t>
+              <a:t>01.05.2019</a:t>
             </a:fld>
             <a:endParaRPr lang="de-DE"/>
           </a:p>
@@ -415,7 +415,7 @@
             <a:fld id="{19FFB102-D3AF-431C-A902-ADE5B2A48608}" type="datetimeFigureOut">
               <a:rPr lang="de-DE" smtClean="0"/>
               <a:pPr/>
-              <a:t>30.04.2019</a:t>
+              <a:t>01.05.2019</a:t>
             </a:fld>
             <a:endParaRPr lang="de-DE"/>
           </a:p>
@@ -2720,31 +2720,6 @@
       </p:sp>
       <p:sp>
         <p:nvSpPr>
-          <p:cNvPr id="3" name="Inhaltsplatzhalter 2">
-            <a:extLst>
-              <a:ext uri="{FF2B5EF4-FFF2-40B4-BE49-F238E27FC236}">
-                <a16:creationId xmlns:a16="http://schemas.microsoft.com/office/drawing/2014/main" id="{7CCBE423-4A1D-4087-9086-57A632B1DCD9}"/>
-              </a:ext>
-            </a:extLst>
-          </p:cNvPr>
-          <p:cNvSpPr>
-            <a:spLocks noGrp="1"/>
-          </p:cNvSpPr>
-          <p:nvPr>
-            <p:ph sz="half" idx="1"/>
-          </p:nvPr>
-        </p:nvSpPr>
-        <p:spPr/>
-        <p:txBody>
-          <a:bodyPr/>
-          <a:lstStyle/>
-          <a:p>
-            <a:endParaRPr lang="de-DE"/>
-          </a:p>
-        </p:txBody>
-      </p:sp>
-      <p:sp>
-        <p:nvSpPr>
           <p:cNvPr id="4" name="Foliennummernplatzhalter 3">
             <a:extLst>
               <a:ext uri="{FF2B5EF4-FFF2-40B4-BE49-F238E27FC236}">
@@ -2768,6 +2743,364 @@
               <a:rPr lang="de-DE" smtClean="0"/>
               <a:t>2</a:t>
             </a:fld>
+            <a:endParaRPr lang="de-DE" dirty="0"/>
+          </a:p>
+        </p:txBody>
+      </p:sp>
+      <p:sp>
+        <p:nvSpPr>
+          <p:cNvPr id="5" name="Rechteck: abgerundete Ecken 4">
+            <a:extLst>
+              <a:ext uri="{FF2B5EF4-FFF2-40B4-BE49-F238E27FC236}">
+                <a16:creationId xmlns:a16="http://schemas.microsoft.com/office/drawing/2014/main" id="{AC9A8BAF-F578-428C-BAFC-A5C77D2F7814}"/>
+              </a:ext>
+            </a:extLst>
+          </p:cNvPr>
+          <p:cNvSpPr/>
+          <p:nvPr/>
+        </p:nvSpPr>
+        <p:spPr>
+          <a:xfrm>
+            <a:off x="2709139" y="2420888"/>
+            <a:ext cx="792088" cy="438800"/>
+          </a:xfrm>
+          <a:prstGeom prst="roundRect">
+            <a:avLst/>
+          </a:prstGeom>
+        </p:spPr>
+        <p:style>
+          <a:lnRef idx="2">
+            <a:schemeClr val="accent1">
+              <a:shade val="50000"/>
+            </a:schemeClr>
+          </a:lnRef>
+          <a:fillRef idx="1">
+            <a:schemeClr val="accent1"/>
+          </a:fillRef>
+          <a:effectRef idx="0">
+            <a:schemeClr val="accent1"/>
+          </a:effectRef>
+          <a:fontRef idx="minor">
+            <a:schemeClr val="lt1"/>
+          </a:fontRef>
+        </p:style>
+        <p:txBody>
+          <a:bodyPr rtlCol="0" anchor="ctr"/>
+          <a:lstStyle/>
+          <a:p>
+            <a:pPr algn="ctr"/>
+            <a:r>
+              <a:rPr lang="de-DE" dirty="0"/>
+              <a:t>Input</a:t>
+            </a:r>
+          </a:p>
+        </p:txBody>
+      </p:sp>
+      <p:sp>
+        <p:nvSpPr>
+          <p:cNvPr id="6" name="Rechteck: abgerundete Ecken 5">
+            <a:extLst>
+              <a:ext uri="{FF2B5EF4-FFF2-40B4-BE49-F238E27FC236}">
+                <a16:creationId xmlns:a16="http://schemas.microsoft.com/office/drawing/2014/main" id="{C52A7B1E-E781-4C26-BEFC-0B373E103407}"/>
+              </a:ext>
+            </a:extLst>
+          </p:cNvPr>
+          <p:cNvSpPr/>
+          <p:nvPr/>
+        </p:nvSpPr>
+        <p:spPr>
+          <a:xfrm>
+            <a:off x="4139952" y="2420888"/>
+            <a:ext cx="792088" cy="438800"/>
+          </a:xfrm>
+          <a:prstGeom prst="roundRect">
+            <a:avLst/>
+          </a:prstGeom>
+        </p:spPr>
+        <p:style>
+          <a:lnRef idx="2">
+            <a:schemeClr val="accent1">
+              <a:shade val="50000"/>
+            </a:schemeClr>
+          </a:lnRef>
+          <a:fillRef idx="1">
+            <a:schemeClr val="accent1"/>
+          </a:fillRef>
+          <a:effectRef idx="0">
+            <a:schemeClr val="accent1"/>
+          </a:effectRef>
+          <a:fontRef idx="minor">
+            <a:schemeClr val="lt1"/>
+          </a:fontRef>
+        </p:style>
+        <p:txBody>
+          <a:bodyPr rtlCol="0" anchor="ctr"/>
+          <a:lstStyle/>
+          <a:p>
+            <a:pPr algn="ctr"/>
+            <a:r>
+              <a:rPr lang="de-DE" dirty="0"/>
+              <a:t>TF</a:t>
+            </a:r>
+          </a:p>
+        </p:txBody>
+      </p:sp>
+      <p:sp>
+        <p:nvSpPr>
+          <p:cNvPr id="7" name="Rechteck: abgerundete Ecken 6">
+            <a:extLst>
+              <a:ext uri="{FF2B5EF4-FFF2-40B4-BE49-F238E27FC236}">
+                <a16:creationId xmlns:a16="http://schemas.microsoft.com/office/drawing/2014/main" id="{69D3576C-7B28-4122-939B-D18F1C1D8D2D}"/>
+              </a:ext>
+            </a:extLst>
+          </p:cNvPr>
+          <p:cNvSpPr/>
+          <p:nvPr/>
+        </p:nvSpPr>
+        <p:spPr>
+          <a:xfrm>
+            <a:off x="5570765" y="2420888"/>
+            <a:ext cx="792088" cy="438800"/>
+          </a:xfrm>
+          <a:prstGeom prst="roundRect">
+            <a:avLst/>
+          </a:prstGeom>
+        </p:spPr>
+        <p:style>
+          <a:lnRef idx="2">
+            <a:schemeClr val="accent1">
+              <a:shade val="50000"/>
+            </a:schemeClr>
+          </a:lnRef>
+          <a:fillRef idx="1">
+            <a:schemeClr val="accent1"/>
+          </a:fillRef>
+          <a:effectRef idx="0">
+            <a:schemeClr val="accent1"/>
+          </a:effectRef>
+          <a:fontRef idx="minor">
+            <a:schemeClr val="lt1"/>
+          </a:fontRef>
+        </p:style>
+        <p:txBody>
+          <a:bodyPr rtlCol="0" anchor="ctr"/>
+          <a:lstStyle/>
+          <a:p>
+            <a:pPr algn="ctr"/>
+            <a:r>
+              <a:rPr lang="de-DE" sz="1400" dirty="0"/>
+              <a:t>Output</a:t>
+            </a:r>
+          </a:p>
+        </p:txBody>
+      </p:sp>
+      <p:cxnSp>
+        <p:nvCxnSpPr>
+          <p:cNvPr id="9" name="Gerade Verbindung mit Pfeil 8">
+            <a:extLst>
+              <a:ext uri="{FF2B5EF4-FFF2-40B4-BE49-F238E27FC236}">
+                <a16:creationId xmlns:a16="http://schemas.microsoft.com/office/drawing/2014/main" id="{D52FC37E-A5C5-47A6-9FCA-241EB9925BE3}"/>
+              </a:ext>
+            </a:extLst>
+          </p:cNvPr>
+          <p:cNvCxnSpPr>
+            <a:cxnSpLocks/>
+            <a:stCxn id="5" idx="3"/>
+            <a:endCxn id="6" idx="1"/>
+          </p:cNvCxnSpPr>
+          <p:nvPr/>
+        </p:nvCxnSpPr>
+        <p:spPr>
+          <a:xfrm>
+            <a:off x="3501227" y="2640288"/>
+            <a:ext cx="638725" cy="0"/>
+          </a:xfrm>
+          <a:prstGeom prst="straightConnector1">
+            <a:avLst/>
+          </a:prstGeom>
+          <a:ln>
+            <a:tailEnd type="triangle"/>
+          </a:ln>
+        </p:spPr>
+        <p:style>
+          <a:lnRef idx="2">
+            <a:schemeClr val="accent1"/>
+          </a:lnRef>
+          <a:fillRef idx="0">
+            <a:schemeClr val="accent1"/>
+          </a:fillRef>
+          <a:effectRef idx="1">
+            <a:schemeClr val="accent1"/>
+          </a:effectRef>
+          <a:fontRef idx="minor">
+            <a:schemeClr val="tx1"/>
+          </a:fontRef>
+        </p:style>
+      </p:cxnSp>
+      <p:cxnSp>
+        <p:nvCxnSpPr>
+          <p:cNvPr id="10" name="Gerade Verbindung mit Pfeil 9">
+            <a:extLst>
+              <a:ext uri="{FF2B5EF4-FFF2-40B4-BE49-F238E27FC236}">
+                <a16:creationId xmlns:a16="http://schemas.microsoft.com/office/drawing/2014/main" id="{5D2F5330-71D9-4B35-AF30-BCE4EEC82825}"/>
+              </a:ext>
+            </a:extLst>
+          </p:cNvPr>
+          <p:cNvCxnSpPr>
+            <a:cxnSpLocks/>
+            <a:stCxn id="6" idx="3"/>
+          </p:cNvCxnSpPr>
+          <p:nvPr/>
+        </p:nvCxnSpPr>
+        <p:spPr>
+          <a:xfrm>
+            <a:off x="4932040" y="2640288"/>
+            <a:ext cx="638725" cy="0"/>
+          </a:xfrm>
+          <a:prstGeom prst="straightConnector1">
+            <a:avLst/>
+          </a:prstGeom>
+          <a:ln>
+            <a:tailEnd type="triangle"/>
+          </a:ln>
+        </p:spPr>
+        <p:style>
+          <a:lnRef idx="2">
+            <a:schemeClr val="accent1"/>
+          </a:lnRef>
+          <a:fillRef idx="0">
+            <a:schemeClr val="accent1"/>
+          </a:fillRef>
+          <a:effectRef idx="1">
+            <a:schemeClr val="accent1"/>
+          </a:effectRef>
+          <a:fontRef idx="minor">
+            <a:schemeClr val="tx1"/>
+          </a:fontRef>
+        </p:style>
+      </p:cxnSp>
+      <p:cxnSp>
+        <p:nvCxnSpPr>
+          <p:cNvPr id="12" name="Gerade Verbindung mit Pfeil 11">
+            <a:extLst>
+              <a:ext uri="{FF2B5EF4-FFF2-40B4-BE49-F238E27FC236}">
+                <a16:creationId xmlns:a16="http://schemas.microsoft.com/office/drawing/2014/main" id="{569F89D3-3306-480C-9D32-4107BDB73328}"/>
+              </a:ext>
+            </a:extLst>
+          </p:cNvPr>
+          <p:cNvCxnSpPr>
+            <a:cxnSpLocks/>
+            <a:stCxn id="6" idx="2"/>
+          </p:cNvCxnSpPr>
+          <p:nvPr/>
+        </p:nvCxnSpPr>
+        <p:spPr>
+          <a:xfrm>
+            <a:off x="4535996" y="2859688"/>
+            <a:ext cx="0" cy="785336"/>
+          </a:xfrm>
+          <a:prstGeom prst="straightConnector1">
+            <a:avLst/>
+          </a:prstGeom>
+          <a:ln>
+            <a:tailEnd type="triangle"/>
+          </a:ln>
+        </p:spPr>
+        <p:style>
+          <a:lnRef idx="2">
+            <a:schemeClr val="accent1"/>
+          </a:lnRef>
+          <a:fillRef idx="0">
+            <a:schemeClr val="accent1"/>
+          </a:fillRef>
+          <a:effectRef idx="1">
+            <a:schemeClr val="accent1"/>
+          </a:effectRef>
+          <a:fontRef idx="minor">
+            <a:schemeClr val="tx1"/>
+          </a:fontRef>
+        </p:style>
+      </p:cxnSp>
+      <p:sp>
+        <p:nvSpPr>
+          <p:cNvPr id="19" name="Textfeld 18">
+            <a:extLst>
+              <a:ext uri="{FF2B5EF4-FFF2-40B4-BE49-F238E27FC236}">
+                <a16:creationId xmlns:a16="http://schemas.microsoft.com/office/drawing/2014/main" id="{E5CC840F-FBD4-41C7-BD15-991D9603A4DC}"/>
+              </a:ext>
+            </a:extLst>
+          </p:cNvPr>
+          <p:cNvSpPr txBox="1"/>
+          <p:nvPr/>
+        </p:nvSpPr>
+        <p:spPr>
+          <a:xfrm>
+            <a:off x="2339752" y="3678698"/>
+            <a:ext cx="5040556" cy="646331"/>
+          </a:xfrm>
+          <a:prstGeom prst="rect">
+            <a:avLst/>
+          </a:prstGeom>
+          <a:noFill/>
+        </p:spPr>
+        <p:txBody>
+          <a:bodyPr wrap="square" rtlCol="0">
+            <a:spAutoFit/>
+          </a:bodyPr>
+          <a:lstStyle/>
+          <a:p>
+            <a:pPr marL="285750" indent="-285750">
+              <a:buFont typeface="Arial" panose="020B0604020202020204" pitchFamily="34" charset="0"/>
+              <a:buChar char="•"/>
+            </a:pPr>
+            <a:r>
+              <a:rPr lang="de-DE" dirty="0"/>
+              <a:t>Mapping </a:t>
+            </a:r>
+            <a:r>
+              <a:rPr lang="de-DE" dirty="0" err="1"/>
+              <a:t>movement</a:t>
+            </a:r>
+            <a:r>
+              <a:rPr lang="de-DE" dirty="0"/>
+              <a:t> in real </a:t>
+            </a:r>
+            <a:r>
+              <a:rPr lang="de-DE" dirty="0" err="1"/>
+              <a:t>world</a:t>
+            </a:r>
+            <a:r>
+              <a:rPr lang="de-DE" dirty="0"/>
+              <a:t> </a:t>
+            </a:r>
+            <a:r>
+              <a:rPr lang="de-DE" dirty="0" err="1"/>
+              <a:t>space</a:t>
+            </a:r>
+            <a:r>
+              <a:rPr lang="de-DE" dirty="0"/>
+              <a:t> to </a:t>
+            </a:r>
+            <a:r>
+              <a:rPr lang="de-DE" dirty="0" err="1"/>
+              <a:t>computer</a:t>
+            </a:r>
+            <a:r>
+              <a:rPr lang="de-DE" dirty="0"/>
+              <a:t> </a:t>
+            </a:r>
+            <a:r>
+              <a:rPr lang="de-DE" dirty="0" err="1"/>
+              <a:t>space</a:t>
+            </a:r>
+            <a:r>
+              <a:rPr lang="de-DE" dirty="0"/>
+              <a:t> </a:t>
+            </a:r>
+            <a:r>
+              <a:rPr lang="de-DE" dirty="0" err="1"/>
+              <a:t>representation</a:t>
+            </a:r>
             <a:endParaRPr lang="de-DE" dirty="0"/>
           </a:p>
         </p:txBody>
@@ -2855,12 +3188,283 @@
             <p:ph sz="half" idx="1"/>
           </p:nvPr>
         </p:nvSpPr>
-        <p:spPr/>
+        <p:spPr>
+          <a:xfrm>
+            <a:off x="1331640" y="2340000"/>
+            <a:ext cx="7200800" cy="2961208"/>
+          </a:xfrm>
+        </p:spPr>
         <p:txBody>
           <a:bodyPr/>
           <a:lstStyle/>
           <a:p>
-            <a:endParaRPr lang="de-DE"/>
+            <a:pPr>
+              <a:buFont typeface="Arial" panose="020B0604020202020204" pitchFamily="34" charset="0"/>
+              <a:buChar char="•"/>
+            </a:pPr>
+            <a:r>
+              <a:rPr lang="de-DE" dirty="0" err="1"/>
+              <a:t>Has</a:t>
+            </a:r>
+            <a:r>
+              <a:rPr lang="de-DE" dirty="0"/>
+              <a:t> </a:t>
+            </a:r>
+            <a:r>
+              <a:rPr lang="de-DE" dirty="0" err="1"/>
+              <a:t>shown</a:t>
+            </a:r>
+            <a:r>
+              <a:rPr lang="de-DE" dirty="0"/>
+              <a:t> </a:t>
+            </a:r>
+            <a:r>
+              <a:rPr lang="de-DE" dirty="0" err="1"/>
+              <a:t>that</a:t>
+            </a:r>
+            <a:r>
+              <a:rPr lang="de-DE" dirty="0"/>
+              <a:t> </a:t>
+            </a:r>
+            <a:r>
+              <a:rPr lang="de-DE" dirty="0" err="1"/>
+              <a:t>the</a:t>
+            </a:r>
+            <a:r>
+              <a:rPr lang="de-DE" dirty="0"/>
+              <a:t> </a:t>
+            </a:r>
+            <a:r>
+              <a:rPr lang="de-DE" dirty="0" err="1"/>
+              <a:t>use</a:t>
+            </a:r>
+            <a:r>
+              <a:rPr lang="de-DE" dirty="0"/>
+              <a:t> of </a:t>
+            </a:r>
+            <a:r>
+              <a:rPr lang="de-DE" dirty="0" err="1"/>
+              <a:t>the</a:t>
+            </a:r>
+            <a:r>
+              <a:rPr lang="de-DE" dirty="0"/>
+              <a:t> </a:t>
+            </a:r>
+            <a:r>
+              <a:rPr lang="de-DE" dirty="0" err="1"/>
+              <a:t>default</a:t>
+            </a:r>
+            <a:r>
+              <a:rPr lang="de-DE" dirty="0"/>
+              <a:t> TF in </a:t>
+            </a:r>
+            <a:r>
+              <a:rPr lang="de-DE" dirty="0" err="1"/>
+              <a:t>common</a:t>
+            </a:r>
+            <a:r>
+              <a:rPr lang="de-DE" dirty="0"/>
+              <a:t> </a:t>
+            </a:r>
+            <a:r>
+              <a:rPr lang="de-DE" dirty="0" err="1"/>
+              <a:t>os</a:t>
+            </a:r>
+            <a:r>
+              <a:rPr lang="de-DE" dirty="0"/>
+              <a:t> </a:t>
+            </a:r>
+            <a:r>
+              <a:rPr lang="de-DE" dirty="0" err="1"/>
+              <a:t>is</a:t>
+            </a:r>
+            <a:r>
+              <a:rPr lang="de-DE" dirty="0"/>
+              <a:t> superior to </a:t>
+            </a:r>
+            <a:r>
+              <a:rPr lang="de-DE" dirty="0" err="1"/>
+              <a:t>constant</a:t>
+            </a:r>
+            <a:r>
+              <a:rPr lang="de-DE" dirty="0"/>
+              <a:t> CD-Gain [1]</a:t>
+            </a:r>
+          </a:p>
+          <a:p>
+            <a:pPr>
+              <a:buFont typeface="Arial" panose="020B0604020202020204" pitchFamily="34" charset="0"/>
+              <a:buChar char="•"/>
+            </a:pPr>
+            <a:endParaRPr lang="de-DE" dirty="0"/>
+          </a:p>
+          <a:p>
+            <a:pPr>
+              <a:buFont typeface="Arial" panose="020B0604020202020204" pitchFamily="34" charset="0"/>
+              <a:buChar char="•"/>
+            </a:pPr>
+            <a:r>
+              <a:rPr lang="de-DE" dirty="0"/>
+              <a:t>DRL </a:t>
+            </a:r>
+            <a:r>
+              <a:rPr lang="de-DE" dirty="0" err="1"/>
+              <a:t>is</a:t>
+            </a:r>
+            <a:r>
+              <a:rPr lang="de-DE" dirty="0"/>
+              <a:t> promising in </a:t>
+            </a:r>
+            <a:r>
+              <a:rPr lang="de-DE" dirty="0" err="1"/>
+              <a:t>solving</a:t>
+            </a:r>
+            <a:r>
+              <a:rPr lang="de-DE" dirty="0"/>
+              <a:t> </a:t>
+            </a:r>
+            <a:r>
+              <a:rPr lang="de-DE" dirty="0" err="1"/>
+              <a:t>certain</a:t>
+            </a:r>
+            <a:r>
+              <a:rPr lang="de-DE" dirty="0"/>
+              <a:t> </a:t>
+            </a:r>
+            <a:r>
+              <a:rPr lang="de-DE" dirty="0" err="1"/>
+              <a:t>task</a:t>
+            </a:r>
+            <a:r>
+              <a:rPr lang="de-DE" dirty="0"/>
+              <a:t>, </a:t>
+            </a:r>
+            <a:r>
+              <a:rPr lang="de-DE" dirty="0" err="1"/>
+              <a:t>without</a:t>
+            </a:r>
+            <a:r>
+              <a:rPr lang="de-DE" dirty="0"/>
+              <a:t>     </a:t>
+            </a:r>
+            <a:r>
+              <a:rPr lang="de-DE" dirty="0" err="1"/>
+              <a:t>prior</a:t>
+            </a:r>
+            <a:r>
+              <a:rPr lang="de-DE" dirty="0"/>
+              <a:t> </a:t>
+            </a:r>
+            <a:r>
+              <a:rPr lang="de-DE" dirty="0" err="1"/>
+              <a:t>knowledge</a:t>
+            </a:r>
+            <a:r>
+              <a:rPr lang="de-DE" dirty="0"/>
+              <a:t> </a:t>
+            </a:r>
+            <a:r>
+              <a:rPr lang="de-DE" dirty="0" err="1"/>
+              <a:t>about</a:t>
+            </a:r>
+            <a:r>
+              <a:rPr lang="de-DE" dirty="0"/>
+              <a:t> </a:t>
+            </a:r>
+            <a:r>
+              <a:rPr lang="de-DE" dirty="0" err="1"/>
+              <a:t>the</a:t>
+            </a:r>
+            <a:r>
+              <a:rPr lang="de-DE" dirty="0"/>
+              <a:t> </a:t>
+            </a:r>
+            <a:r>
+              <a:rPr lang="de-DE" dirty="0" err="1"/>
+              <a:t>data</a:t>
+            </a:r>
+            <a:r>
+              <a:rPr lang="de-DE" dirty="0"/>
+              <a:t> [2],[3]</a:t>
+            </a:r>
+          </a:p>
+          <a:p>
+            <a:pPr>
+              <a:buFont typeface="Arial" panose="020B0604020202020204" pitchFamily="34" charset="0"/>
+              <a:buChar char="•"/>
+            </a:pPr>
+            <a:endParaRPr lang="de-DE" dirty="0"/>
+          </a:p>
+          <a:p>
+            <a:pPr indent="0"/>
+            <a:endParaRPr lang="de-DE" dirty="0"/>
+          </a:p>
+          <a:p>
+            <a:pPr>
+              <a:buFont typeface="Arial" panose="020B0604020202020204" pitchFamily="34" charset="0"/>
+              <a:buChar char="•"/>
+            </a:pPr>
+            <a:endParaRPr lang="de-DE" dirty="0"/>
+          </a:p>
+          <a:p>
+            <a:pPr>
+              <a:buFont typeface="Arial" panose="020B0604020202020204" pitchFamily="34" charset="0"/>
+              <a:buChar char="•"/>
+            </a:pPr>
+            <a:endParaRPr lang="de-DE" dirty="0"/>
+          </a:p>
+          <a:p>
+            <a:pPr indent="0"/>
+            <a:endParaRPr lang="de-DE" dirty="0"/>
+          </a:p>
+          <a:p>
+            <a:pPr>
+              <a:buFont typeface="Arial" panose="020B0604020202020204" pitchFamily="34" charset="0"/>
+              <a:buChar char="•"/>
+            </a:pPr>
+            <a:endParaRPr lang="de-DE" dirty="0"/>
+          </a:p>
+          <a:p>
+            <a:pPr>
+              <a:buFont typeface="Arial" panose="020B0604020202020204" pitchFamily="34" charset="0"/>
+              <a:buChar char="•"/>
+            </a:pPr>
+            <a:endParaRPr lang="de-DE" dirty="0"/>
+          </a:p>
+          <a:p>
+            <a:pPr>
+              <a:buFont typeface="Arial" panose="020B0604020202020204" pitchFamily="34" charset="0"/>
+              <a:buChar char="•"/>
+            </a:pPr>
+            <a:endParaRPr lang="de-DE" dirty="0"/>
+          </a:p>
+          <a:p>
+            <a:pPr>
+              <a:buFont typeface="Arial" panose="020B0604020202020204" pitchFamily="34" charset="0"/>
+              <a:buChar char="•"/>
+            </a:pPr>
+            <a:endParaRPr lang="de-DE" dirty="0"/>
+          </a:p>
+          <a:p>
+            <a:pPr>
+              <a:buFont typeface="Arial" panose="020B0604020202020204" pitchFamily="34" charset="0"/>
+              <a:buChar char="•"/>
+            </a:pPr>
+            <a:endParaRPr lang="de-DE" dirty="0"/>
+          </a:p>
+          <a:p>
+            <a:pPr>
+              <a:buFont typeface="Arial" panose="020B0604020202020204" pitchFamily="34" charset="0"/>
+              <a:buChar char="•"/>
+            </a:pPr>
+            <a:endParaRPr lang="de-DE" dirty="0"/>
+          </a:p>
+          <a:p>
+            <a:pPr>
+              <a:buFont typeface="Arial" panose="020B0604020202020204" pitchFamily="34" charset="0"/>
+              <a:buChar char="•"/>
+            </a:pPr>
+            <a:endParaRPr lang="de-DE" dirty="0"/>
           </a:p>
         </p:txBody>
       </p:sp>
@@ -2890,6 +3494,198 @@
               <a:t>3</a:t>
             </a:fld>
             <a:endParaRPr lang="de-DE" dirty="0"/>
+          </a:p>
+        </p:txBody>
+      </p:sp>
+      <p:sp>
+        <p:nvSpPr>
+          <p:cNvPr id="6" name="Textfeld 5">
+            <a:extLst>
+              <a:ext uri="{FF2B5EF4-FFF2-40B4-BE49-F238E27FC236}">
+                <a16:creationId xmlns:a16="http://schemas.microsoft.com/office/drawing/2014/main" id="{921CCF3A-0C67-402E-BC22-1C95BCD91F34}"/>
+              </a:ext>
+            </a:extLst>
+          </p:cNvPr>
+          <p:cNvSpPr txBox="1"/>
+          <p:nvPr/>
+        </p:nvSpPr>
+        <p:spPr>
+          <a:xfrm>
+            <a:off x="1332000" y="5661248"/>
+            <a:ext cx="7183350" cy="1046440"/>
+          </a:xfrm>
+          <a:prstGeom prst="rect">
+            <a:avLst/>
+          </a:prstGeom>
+          <a:noFill/>
+        </p:spPr>
+        <p:txBody>
+          <a:bodyPr wrap="square" rtlCol="0">
+            <a:spAutoFit/>
+          </a:bodyPr>
+          <a:lstStyle/>
+          <a:p>
+            <a:r>
+              <a:rPr lang="de-DE" sz="1000" dirty="0"/>
+              <a:t>[1]</a:t>
+            </a:r>
+            <a:r>
+              <a:rPr lang="en-US" sz="1000" dirty="0"/>
+              <a:t> </a:t>
+            </a:r>
+            <a:r>
+              <a:rPr lang="en-US" sz="1000" dirty="0" err="1"/>
+              <a:t>Casiez</a:t>
+            </a:r>
+            <a:r>
+              <a:rPr lang="en-US" sz="1000" dirty="0"/>
+              <a:t>, G., Vogel, D., Balakrishnan, R., &amp; Cockburn, A. (2008). The impact of control-display gain on user performance in pointing tasks. Human–computer interaction, 23(3), 215-250.</a:t>
+            </a:r>
+          </a:p>
+          <a:p>
+            <a:r>
+              <a:rPr lang="en-US" sz="1000" dirty="0"/>
+              <a:t>[2] </a:t>
+            </a:r>
+            <a:r>
+              <a:rPr lang="de-DE" sz="1050" dirty="0" err="1"/>
+              <a:t>Mnih</a:t>
+            </a:r>
+            <a:r>
+              <a:rPr lang="de-DE" sz="1050" dirty="0"/>
+              <a:t>, V., </a:t>
+            </a:r>
+            <a:r>
+              <a:rPr lang="de-DE" sz="1050" dirty="0" err="1"/>
+              <a:t>Kavukcuoglu</a:t>
+            </a:r>
+            <a:r>
+              <a:rPr lang="de-DE" sz="1050" dirty="0"/>
+              <a:t>, K., </a:t>
+            </a:r>
+            <a:r>
+              <a:rPr lang="de-DE" sz="1050" dirty="0" err="1"/>
+              <a:t>Silver</a:t>
+            </a:r>
+            <a:r>
+              <a:rPr lang="de-DE" sz="1050" dirty="0"/>
+              <a:t>, D., Graves, A., </a:t>
+            </a:r>
+            <a:r>
+              <a:rPr lang="de-DE" sz="1050" dirty="0" err="1"/>
+              <a:t>Antonoglou</a:t>
+            </a:r>
+            <a:r>
+              <a:rPr lang="de-DE" sz="1050" dirty="0"/>
+              <a:t>, I., </a:t>
+            </a:r>
+            <a:r>
+              <a:rPr lang="de-DE" sz="1050" dirty="0" err="1"/>
+              <a:t>Wierstra</a:t>
+            </a:r>
+            <a:r>
+              <a:rPr lang="de-DE" sz="1050" dirty="0"/>
+              <a:t>, D., &amp; Riedmiller, M. (2013). </a:t>
+            </a:r>
+            <a:r>
+              <a:rPr lang="de-DE" sz="1050" dirty="0" err="1"/>
+              <a:t>Playing</a:t>
+            </a:r>
+            <a:r>
+              <a:rPr lang="de-DE" sz="1050" dirty="0"/>
+              <a:t> </a:t>
+            </a:r>
+            <a:r>
+              <a:rPr lang="de-DE" sz="1050" dirty="0" err="1"/>
+              <a:t>atari</a:t>
+            </a:r>
+            <a:r>
+              <a:rPr lang="de-DE" sz="1050" dirty="0"/>
+              <a:t> </a:t>
+            </a:r>
+            <a:r>
+              <a:rPr lang="de-DE" sz="1050" dirty="0" err="1"/>
+              <a:t>with</a:t>
+            </a:r>
+            <a:r>
+              <a:rPr lang="de-DE" sz="1050" dirty="0"/>
+              <a:t> </a:t>
+            </a:r>
+            <a:r>
+              <a:rPr lang="de-DE" sz="1050" dirty="0" err="1"/>
+              <a:t>deep</a:t>
+            </a:r>
+            <a:r>
+              <a:rPr lang="de-DE" sz="1050" dirty="0"/>
+              <a:t> </a:t>
+            </a:r>
+            <a:r>
+              <a:rPr lang="de-DE" sz="1050" dirty="0" err="1"/>
+              <a:t>reinforcement</a:t>
+            </a:r>
+            <a:r>
+              <a:rPr lang="de-DE" sz="1050" dirty="0"/>
+              <a:t> </a:t>
+            </a:r>
+            <a:r>
+              <a:rPr lang="de-DE" sz="1050" dirty="0" err="1"/>
+              <a:t>learning</a:t>
+            </a:r>
+            <a:r>
+              <a:rPr lang="de-DE" sz="1050" dirty="0"/>
+              <a:t>. </a:t>
+            </a:r>
+            <a:r>
+              <a:rPr lang="de-DE" sz="1050" dirty="0" err="1"/>
+              <a:t>arXiv</a:t>
+            </a:r>
+            <a:r>
+              <a:rPr lang="de-DE" sz="1050" dirty="0"/>
+              <a:t> </a:t>
+            </a:r>
+            <a:r>
+              <a:rPr lang="de-DE" sz="1050" dirty="0" err="1"/>
+              <a:t>preprint</a:t>
+            </a:r>
+            <a:r>
+              <a:rPr lang="de-DE" sz="1050" dirty="0"/>
+              <a:t> arXiv:1312.5602.</a:t>
+            </a:r>
+          </a:p>
+          <a:p>
+            <a:r>
+              <a:rPr lang="de-DE" sz="1050" dirty="0"/>
+              <a:t>[3] </a:t>
+            </a:r>
+            <a:r>
+              <a:rPr lang="en-US" sz="1050" dirty="0"/>
+              <a:t>Silver, D., Huang, A., Maddison, C. J., </a:t>
+            </a:r>
+            <a:r>
+              <a:rPr lang="en-US" sz="1050" dirty="0" err="1"/>
+              <a:t>Guez</a:t>
+            </a:r>
+            <a:r>
+              <a:rPr lang="en-US" sz="1050" dirty="0"/>
+              <a:t>, A., </a:t>
+            </a:r>
+            <a:r>
+              <a:rPr lang="en-US" sz="1050" dirty="0" err="1"/>
+              <a:t>Sifre</a:t>
+            </a:r>
+            <a:r>
+              <a:rPr lang="en-US" sz="1050" dirty="0"/>
+              <a:t>, L., Van Den </a:t>
+            </a:r>
+            <a:r>
+              <a:rPr lang="en-US" sz="1050" dirty="0" err="1"/>
+              <a:t>Driessche</a:t>
+            </a:r>
+            <a:r>
+              <a:rPr lang="en-US" sz="1050" dirty="0"/>
+              <a:t>, G., ... &amp; Dieleman, S. (2016). Mastering the game of Go with deep neural networks and tree search. nature, 529(7587), 484.</a:t>
+            </a:r>
+            <a:endParaRPr lang="de-DE" sz="1000" dirty="0"/>
           </a:p>
         </p:txBody>
       </p:sp>
@@ -2958,31 +3754,6 @@
       </p:sp>
       <p:sp>
         <p:nvSpPr>
-          <p:cNvPr id="3" name="Inhaltsplatzhalter 2">
-            <a:extLst>
-              <a:ext uri="{FF2B5EF4-FFF2-40B4-BE49-F238E27FC236}">
-                <a16:creationId xmlns:a16="http://schemas.microsoft.com/office/drawing/2014/main" id="{7CCBE423-4A1D-4087-9086-57A632B1DCD9}"/>
-              </a:ext>
-            </a:extLst>
-          </p:cNvPr>
-          <p:cNvSpPr>
-            <a:spLocks noGrp="1"/>
-          </p:cNvSpPr>
-          <p:nvPr>
-            <p:ph sz="half" idx="1"/>
-          </p:nvPr>
-        </p:nvSpPr>
-        <p:spPr/>
-        <p:txBody>
-          <a:bodyPr/>
-          <a:lstStyle/>
-          <a:p>
-            <a:endParaRPr lang="de-DE" dirty="0"/>
-          </a:p>
-        </p:txBody>
-      </p:sp>
-      <p:sp>
-        <p:nvSpPr>
           <p:cNvPr id="4" name="Foliennummernplatzhalter 3">
             <a:extLst>
               <a:ext uri="{FF2B5EF4-FFF2-40B4-BE49-F238E27FC236}">
@@ -3007,6 +3778,684 @@
               <a:t>4</a:t>
             </a:fld>
             <a:endParaRPr lang="de-DE" dirty="0"/>
+          </a:p>
+        </p:txBody>
+      </p:sp>
+      <p:sp>
+        <p:nvSpPr>
+          <p:cNvPr id="11" name="Rechteck: abgerundete Ecken 10">
+            <a:extLst>
+              <a:ext uri="{FF2B5EF4-FFF2-40B4-BE49-F238E27FC236}">
+                <a16:creationId xmlns:a16="http://schemas.microsoft.com/office/drawing/2014/main" id="{417B5DA9-3F5C-4F92-ADC6-0A7AB976E321}"/>
+              </a:ext>
+            </a:extLst>
+          </p:cNvPr>
+          <p:cNvSpPr/>
+          <p:nvPr/>
+        </p:nvSpPr>
+        <p:spPr>
+          <a:xfrm>
+            <a:off x="2709139" y="2420888"/>
+            <a:ext cx="792088" cy="438800"/>
+          </a:xfrm>
+          <a:prstGeom prst="roundRect">
+            <a:avLst/>
+          </a:prstGeom>
+        </p:spPr>
+        <p:style>
+          <a:lnRef idx="2">
+            <a:schemeClr val="accent1">
+              <a:shade val="50000"/>
+            </a:schemeClr>
+          </a:lnRef>
+          <a:fillRef idx="1">
+            <a:schemeClr val="accent1"/>
+          </a:fillRef>
+          <a:effectRef idx="0">
+            <a:schemeClr val="accent1"/>
+          </a:effectRef>
+          <a:fontRef idx="minor">
+            <a:schemeClr val="lt1"/>
+          </a:fontRef>
+        </p:style>
+        <p:txBody>
+          <a:bodyPr rtlCol="0" anchor="ctr"/>
+          <a:lstStyle/>
+          <a:p>
+            <a:pPr algn="ctr"/>
+            <a:r>
+              <a:rPr lang="de-DE" dirty="0"/>
+              <a:t>Input</a:t>
+            </a:r>
+          </a:p>
+        </p:txBody>
+      </p:sp>
+      <p:sp>
+        <p:nvSpPr>
+          <p:cNvPr id="12" name="Rechteck: abgerundete Ecken 11">
+            <a:extLst>
+              <a:ext uri="{FF2B5EF4-FFF2-40B4-BE49-F238E27FC236}">
+                <a16:creationId xmlns:a16="http://schemas.microsoft.com/office/drawing/2014/main" id="{838F74FD-BE07-4AD8-A989-25BCF9F9AB78}"/>
+              </a:ext>
+            </a:extLst>
+          </p:cNvPr>
+          <p:cNvSpPr/>
+          <p:nvPr/>
+        </p:nvSpPr>
+        <p:spPr>
+          <a:xfrm>
+            <a:off x="4139952" y="2420888"/>
+            <a:ext cx="792088" cy="438800"/>
+          </a:xfrm>
+          <a:prstGeom prst="roundRect">
+            <a:avLst/>
+          </a:prstGeom>
+        </p:spPr>
+        <p:style>
+          <a:lnRef idx="2">
+            <a:schemeClr val="accent1">
+              <a:shade val="50000"/>
+            </a:schemeClr>
+          </a:lnRef>
+          <a:fillRef idx="1">
+            <a:schemeClr val="accent1"/>
+          </a:fillRef>
+          <a:effectRef idx="0">
+            <a:schemeClr val="accent1"/>
+          </a:effectRef>
+          <a:fontRef idx="minor">
+            <a:schemeClr val="lt1"/>
+          </a:fontRef>
+        </p:style>
+        <p:txBody>
+          <a:bodyPr rtlCol="0" anchor="ctr"/>
+          <a:lstStyle/>
+          <a:p>
+            <a:pPr algn="ctr"/>
+            <a:r>
+              <a:rPr lang="de-DE" dirty="0"/>
+              <a:t>TF</a:t>
+            </a:r>
+          </a:p>
+        </p:txBody>
+      </p:sp>
+      <p:sp>
+        <p:nvSpPr>
+          <p:cNvPr id="13" name="Rechteck: abgerundete Ecken 12">
+            <a:extLst>
+              <a:ext uri="{FF2B5EF4-FFF2-40B4-BE49-F238E27FC236}">
+                <a16:creationId xmlns:a16="http://schemas.microsoft.com/office/drawing/2014/main" id="{5E513ADE-8111-4E8D-A143-50041FD1823A}"/>
+              </a:ext>
+            </a:extLst>
+          </p:cNvPr>
+          <p:cNvSpPr/>
+          <p:nvPr/>
+        </p:nvSpPr>
+        <p:spPr>
+          <a:xfrm>
+            <a:off x="5570765" y="2420888"/>
+            <a:ext cx="792088" cy="438800"/>
+          </a:xfrm>
+          <a:prstGeom prst="roundRect">
+            <a:avLst/>
+          </a:prstGeom>
+        </p:spPr>
+        <p:style>
+          <a:lnRef idx="2">
+            <a:schemeClr val="accent1">
+              <a:shade val="50000"/>
+            </a:schemeClr>
+          </a:lnRef>
+          <a:fillRef idx="1">
+            <a:schemeClr val="accent1"/>
+          </a:fillRef>
+          <a:effectRef idx="0">
+            <a:schemeClr val="accent1"/>
+          </a:effectRef>
+          <a:fontRef idx="minor">
+            <a:schemeClr val="lt1"/>
+          </a:fontRef>
+        </p:style>
+        <p:txBody>
+          <a:bodyPr rtlCol="0" anchor="ctr"/>
+          <a:lstStyle/>
+          <a:p>
+            <a:pPr algn="ctr"/>
+            <a:r>
+              <a:rPr lang="de-DE" sz="1400" dirty="0"/>
+              <a:t>Output</a:t>
+            </a:r>
+          </a:p>
+        </p:txBody>
+      </p:sp>
+      <p:cxnSp>
+        <p:nvCxnSpPr>
+          <p:cNvPr id="14" name="Gerade Verbindung mit Pfeil 13">
+            <a:extLst>
+              <a:ext uri="{FF2B5EF4-FFF2-40B4-BE49-F238E27FC236}">
+                <a16:creationId xmlns:a16="http://schemas.microsoft.com/office/drawing/2014/main" id="{4B9843CA-D692-4B8E-890D-81624819A769}"/>
+              </a:ext>
+            </a:extLst>
+          </p:cNvPr>
+          <p:cNvCxnSpPr>
+            <a:cxnSpLocks/>
+            <a:stCxn id="11" idx="3"/>
+            <a:endCxn id="12" idx="1"/>
+          </p:cNvCxnSpPr>
+          <p:nvPr/>
+        </p:nvCxnSpPr>
+        <p:spPr>
+          <a:xfrm>
+            <a:off x="3501227" y="2640288"/>
+            <a:ext cx="638725" cy="0"/>
+          </a:xfrm>
+          <a:prstGeom prst="straightConnector1">
+            <a:avLst/>
+          </a:prstGeom>
+          <a:ln>
+            <a:tailEnd type="triangle"/>
+          </a:ln>
+        </p:spPr>
+        <p:style>
+          <a:lnRef idx="2">
+            <a:schemeClr val="accent1"/>
+          </a:lnRef>
+          <a:fillRef idx="0">
+            <a:schemeClr val="accent1"/>
+          </a:fillRef>
+          <a:effectRef idx="1">
+            <a:schemeClr val="accent1"/>
+          </a:effectRef>
+          <a:fontRef idx="minor">
+            <a:schemeClr val="tx1"/>
+          </a:fontRef>
+        </p:style>
+      </p:cxnSp>
+      <p:cxnSp>
+        <p:nvCxnSpPr>
+          <p:cNvPr id="15" name="Gerade Verbindung mit Pfeil 14">
+            <a:extLst>
+              <a:ext uri="{FF2B5EF4-FFF2-40B4-BE49-F238E27FC236}">
+                <a16:creationId xmlns:a16="http://schemas.microsoft.com/office/drawing/2014/main" id="{B1B9FD12-09DC-4592-965E-6F23DCD7D60A}"/>
+              </a:ext>
+            </a:extLst>
+          </p:cNvPr>
+          <p:cNvCxnSpPr>
+            <a:cxnSpLocks/>
+            <a:stCxn id="12" idx="3"/>
+          </p:cNvCxnSpPr>
+          <p:nvPr/>
+        </p:nvCxnSpPr>
+        <p:spPr>
+          <a:xfrm>
+            <a:off x="4932040" y="2640288"/>
+            <a:ext cx="638725" cy="0"/>
+          </a:xfrm>
+          <a:prstGeom prst="straightConnector1">
+            <a:avLst/>
+          </a:prstGeom>
+          <a:ln>
+            <a:tailEnd type="triangle"/>
+          </a:ln>
+        </p:spPr>
+        <p:style>
+          <a:lnRef idx="2">
+            <a:schemeClr val="accent1"/>
+          </a:lnRef>
+          <a:fillRef idx="0">
+            <a:schemeClr val="accent1"/>
+          </a:fillRef>
+          <a:effectRef idx="1">
+            <a:schemeClr val="accent1"/>
+          </a:effectRef>
+          <a:fontRef idx="minor">
+            <a:schemeClr val="tx1"/>
+          </a:fontRef>
+        </p:style>
+      </p:cxnSp>
+      <p:cxnSp>
+        <p:nvCxnSpPr>
+          <p:cNvPr id="16" name="Gerade Verbindung mit Pfeil 15">
+            <a:extLst>
+              <a:ext uri="{FF2B5EF4-FFF2-40B4-BE49-F238E27FC236}">
+                <a16:creationId xmlns:a16="http://schemas.microsoft.com/office/drawing/2014/main" id="{7549C4FC-CA84-448B-8474-678815EE07E7}"/>
+              </a:ext>
+            </a:extLst>
+          </p:cNvPr>
+          <p:cNvCxnSpPr>
+            <a:cxnSpLocks/>
+          </p:cNvCxnSpPr>
+          <p:nvPr/>
+        </p:nvCxnSpPr>
+        <p:spPr>
+          <a:xfrm>
+            <a:off x="4427984" y="2859688"/>
+            <a:ext cx="0" cy="785336"/>
+          </a:xfrm>
+          <a:prstGeom prst="straightConnector1">
+            <a:avLst/>
+          </a:prstGeom>
+          <a:ln>
+            <a:tailEnd type="triangle"/>
+          </a:ln>
+        </p:spPr>
+        <p:style>
+          <a:lnRef idx="2">
+            <a:schemeClr val="accent1"/>
+          </a:lnRef>
+          <a:fillRef idx="0">
+            <a:schemeClr val="accent1"/>
+          </a:fillRef>
+          <a:effectRef idx="1">
+            <a:schemeClr val="accent1"/>
+          </a:effectRef>
+          <a:fontRef idx="minor">
+            <a:schemeClr val="tx1"/>
+          </a:fontRef>
+        </p:style>
+      </p:cxnSp>
+      <p:cxnSp>
+        <p:nvCxnSpPr>
+          <p:cNvPr id="18" name="Gerade Verbindung mit Pfeil 17">
+            <a:extLst>
+              <a:ext uri="{FF2B5EF4-FFF2-40B4-BE49-F238E27FC236}">
+                <a16:creationId xmlns:a16="http://schemas.microsoft.com/office/drawing/2014/main" id="{4C75FB38-6233-4D2B-9B36-C66FF3CF061B}"/>
+              </a:ext>
+            </a:extLst>
+          </p:cNvPr>
+          <p:cNvCxnSpPr>
+            <a:cxnSpLocks/>
+          </p:cNvCxnSpPr>
+          <p:nvPr/>
+        </p:nvCxnSpPr>
+        <p:spPr>
+          <a:xfrm flipV="1">
+            <a:off x="4644008" y="2852936"/>
+            <a:ext cx="0" cy="792088"/>
+          </a:xfrm>
+          <a:prstGeom prst="straightConnector1">
+            <a:avLst/>
+          </a:prstGeom>
+          <a:ln>
+            <a:tailEnd type="triangle"/>
+          </a:ln>
+        </p:spPr>
+        <p:style>
+          <a:lnRef idx="2">
+            <a:schemeClr val="accent2"/>
+          </a:lnRef>
+          <a:fillRef idx="0">
+            <a:schemeClr val="accent2"/>
+          </a:fillRef>
+          <a:effectRef idx="1">
+            <a:schemeClr val="accent2"/>
+          </a:effectRef>
+          <a:fontRef idx="minor">
+            <a:schemeClr val="tx1"/>
+          </a:fontRef>
+        </p:style>
+      </p:cxnSp>
+      <p:sp>
+        <p:nvSpPr>
+          <p:cNvPr id="23" name="Rechteck: abgerundete Ecken 22">
+            <a:extLst>
+              <a:ext uri="{FF2B5EF4-FFF2-40B4-BE49-F238E27FC236}">
+                <a16:creationId xmlns:a16="http://schemas.microsoft.com/office/drawing/2014/main" id="{475141F2-2661-4BC2-BD83-EAF3443DD9E5}"/>
+              </a:ext>
+            </a:extLst>
+          </p:cNvPr>
+          <p:cNvSpPr/>
+          <p:nvPr/>
+        </p:nvSpPr>
+        <p:spPr>
+          <a:xfrm>
+            <a:off x="4139952" y="3645024"/>
+            <a:ext cx="792088" cy="438800"/>
+          </a:xfrm>
+          <a:prstGeom prst="roundRect">
+            <a:avLst/>
+          </a:prstGeom>
+        </p:spPr>
+        <p:style>
+          <a:lnRef idx="2">
+            <a:schemeClr val="accent2">
+              <a:shade val="50000"/>
+            </a:schemeClr>
+          </a:lnRef>
+          <a:fillRef idx="1">
+            <a:schemeClr val="accent2"/>
+          </a:fillRef>
+          <a:effectRef idx="0">
+            <a:schemeClr val="accent2"/>
+          </a:effectRef>
+          <a:fontRef idx="minor">
+            <a:schemeClr val="lt1"/>
+          </a:fontRef>
+        </p:style>
+        <p:txBody>
+          <a:bodyPr rtlCol="0" anchor="ctr"/>
+          <a:lstStyle/>
+          <a:p>
+            <a:pPr algn="ctr"/>
+            <a:r>
+              <a:rPr lang="de-DE" dirty="0"/>
+              <a:t>DRL</a:t>
+            </a:r>
+          </a:p>
+        </p:txBody>
+      </p:sp>
+      <p:sp>
+        <p:nvSpPr>
+          <p:cNvPr id="25" name="Rechteck: abgerundete Ecken 24">
+            <a:extLst>
+              <a:ext uri="{FF2B5EF4-FFF2-40B4-BE49-F238E27FC236}">
+                <a16:creationId xmlns:a16="http://schemas.microsoft.com/office/drawing/2014/main" id="{BC3BD950-945E-4494-A5AC-51F986E8B875}"/>
+              </a:ext>
+            </a:extLst>
+          </p:cNvPr>
+          <p:cNvSpPr/>
+          <p:nvPr/>
+        </p:nvSpPr>
+        <p:spPr>
+          <a:xfrm>
+            <a:off x="5415622" y="3142655"/>
+            <a:ext cx="1102373" cy="438800"/>
+          </a:xfrm>
+          <a:prstGeom prst="roundRect">
+            <a:avLst/>
+          </a:prstGeom>
+        </p:spPr>
+        <p:style>
+          <a:lnRef idx="2">
+            <a:schemeClr val="accent3">
+              <a:shade val="50000"/>
+            </a:schemeClr>
+          </a:lnRef>
+          <a:fillRef idx="1">
+            <a:schemeClr val="accent3"/>
+          </a:fillRef>
+          <a:effectRef idx="0">
+            <a:schemeClr val="accent3"/>
+          </a:effectRef>
+          <a:fontRef idx="minor">
+            <a:schemeClr val="lt1"/>
+          </a:fontRef>
+        </p:style>
+        <p:txBody>
+          <a:bodyPr rtlCol="0" anchor="ctr"/>
+          <a:lstStyle/>
+          <a:p>
+            <a:pPr algn="ctr"/>
+            <a:r>
+              <a:rPr lang="de-DE" sz="1400" dirty="0"/>
+              <a:t>Evaluation</a:t>
+            </a:r>
+          </a:p>
+        </p:txBody>
+      </p:sp>
+      <p:sp>
+        <p:nvSpPr>
+          <p:cNvPr id="26" name="Rechteck: abgerundete Ecken 25">
+            <a:extLst>
+              <a:ext uri="{FF2B5EF4-FFF2-40B4-BE49-F238E27FC236}">
+                <a16:creationId xmlns:a16="http://schemas.microsoft.com/office/drawing/2014/main" id="{74434370-EFC9-4C0C-86FC-43740A472B8F}"/>
+              </a:ext>
+            </a:extLst>
+          </p:cNvPr>
+          <p:cNvSpPr/>
+          <p:nvPr/>
+        </p:nvSpPr>
+        <p:spPr>
+          <a:xfrm>
+            <a:off x="6948264" y="3142655"/>
+            <a:ext cx="792088" cy="438800"/>
+          </a:xfrm>
+          <a:prstGeom prst="roundRect">
+            <a:avLst/>
+          </a:prstGeom>
+        </p:spPr>
+        <p:style>
+          <a:lnRef idx="2">
+            <a:schemeClr val="accent3">
+              <a:shade val="50000"/>
+            </a:schemeClr>
+          </a:lnRef>
+          <a:fillRef idx="1">
+            <a:schemeClr val="accent3"/>
+          </a:fillRef>
+          <a:effectRef idx="0">
+            <a:schemeClr val="accent3"/>
+          </a:effectRef>
+          <a:fontRef idx="minor">
+            <a:schemeClr val="lt1"/>
+          </a:fontRef>
+        </p:style>
+        <p:txBody>
+          <a:bodyPr rtlCol="0" anchor="ctr"/>
+          <a:lstStyle/>
+          <a:p>
+            <a:pPr algn="ctr"/>
+            <a:r>
+              <a:rPr lang="de-DE" sz="1400" dirty="0"/>
+              <a:t>Study</a:t>
+            </a:r>
+          </a:p>
+        </p:txBody>
+      </p:sp>
+      <p:cxnSp>
+        <p:nvCxnSpPr>
+          <p:cNvPr id="28" name="Gerade Verbindung mit Pfeil 27">
+            <a:extLst>
+              <a:ext uri="{FF2B5EF4-FFF2-40B4-BE49-F238E27FC236}">
+                <a16:creationId xmlns:a16="http://schemas.microsoft.com/office/drawing/2014/main" id="{81408192-97C6-4204-9E83-973F106390BC}"/>
+              </a:ext>
+            </a:extLst>
+          </p:cNvPr>
+          <p:cNvCxnSpPr>
+            <a:stCxn id="13" idx="2"/>
+            <a:endCxn id="25" idx="0"/>
+          </p:cNvCxnSpPr>
+          <p:nvPr/>
+        </p:nvCxnSpPr>
+        <p:spPr>
+          <a:xfrm>
+            <a:off x="5966809" y="2859688"/>
+            <a:ext cx="0" cy="282967"/>
+          </a:xfrm>
+          <a:prstGeom prst="straightConnector1">
+            <a:avLst/>
+          </a:prstGeom>
+          <a:ln>
+            <a:tailEnd type="triangle"/>
+          </a:ln>
+        </p:spPr>
+        <p:style>
+          <a:lnRef idx="2">
+            <a:schemeClr val="accent3"/>
+          </a:lnRef>
+          <a:fillRef idx="0">
+            <a:schemeClr val="accent3"/>
+          </a:fillRef>
+          <a:effectRef idx="1">
+            <a:schemeClr val="accent3"/>
+          </a:effectRef>
+          <a:fontRef idx="minor">
+            <a:schemeClr val="tx1"/>
+          </a:fontRef>
+        </p:style>
+      </p:cxnSp>
+      <p:cxnSp>
+        <p:nvCxnSpPr>
+          <p:cNvPr id="30" name="Gerade Verbindung mit Pfeil 29">
+            <a:extLst>
+              <a:ext uri="{FF2B5EF4-FFF2-40B4-BE49-F238E27FC236}">
+                <a16:creationId xmlns:a16="http://schemas.microsoft.com/office/drawing/2014/main" id="{9B8FFA09-63E9-4482-A48E-83152815CCD2}"/>
+              </a:ext>
+            </a:extLst>
+          </p:cNvPr>
+          <p:cNvCxnSpPr>
+            <a:stCxn id="25" idx="1"/>
+            <a:endCxn id="23" idx="3"/>
+          </p:cNvCxnSpPr>
+          <p:nvPr/>
+        </p:nvCxnSpPr>
+        <p:spPr>
+          <a:xfrm flipH="1">
+            <a:off x="4932040" y="3362055"/>
+            <a:ext cx="483582" cy="502369"/>
+          </a:xfrm>
+          <a:prstGeom prst="straightConnector1">
+            <a:avLst/>
+          </a:prstGeom>
+          <a:ln>
+            <a:tailEnd type="triangle"/>
+          </a:ln>
+        </p:spPr>
+        <p:style>
+          <a:lnRef idx="2">
+            <a:schemeClr val="accent3"/>
+          </a:lnRef>
+          <a:fillRef idx="0">
+            <a:schemeClr val="accent3"/>
+          </a:fillRef>
+          <a:effectRef idx="1">
+            <a:schemeClr val="accent3"/>
+          </a:effectRef>
+          <a:fontRef idx="minor">
+            <a:schemeClr val="tx1"/>
+          </a:fontRef>
+        </p:style>
+      </p:cxnSp>
+      <p:cxnSp>
+        <p:nvCxnSpPr>
+          <p:cNvPr id="32" name="Gerade Verbindung mit Pfeil 31">
+            <a:extLst>
+              <a:ext uri="{FF2B5EF4-FFF2-40B4-BE49-F238E27FC236}">
+                <a16:creationId xmlns:a16="http://schemas.microsoft.com/office/drawing/2014/main" id="{C52D6F92-6AFD-4151-B30A-D6F18313F967}"/>
+              </a:ext>
+            </a:extLst>
+          </p:cNvPr>
+          <p:cNvCxnSpPr>
+            <a:stCxn id="25" idx="3"/>
+            <a:endCxn id="26" idx="1"/>
+          </p:cNvCxnSpPr>
+          <p:nvPr/>
+        </p:nvCxnSpPr>
+        <p:spPr>
+          <a:xfrm>
+            <a:off x="6517995" y="3362055"/>
+            <a:ext cx="430269" cy="0"/>
+          </a:xfrm>
+          <a:prstGeom prst="straightConnector1">
+            <a:avLst/>
+          </a:prstGeom>
+          <a:ln>
+            <a:tailEnd type="triangle"/>
+          </a:ln>
+        </p:spPr>
+        <p:style>
+          <a:lnRef idx="2">
+            <a:schemeClr val="accent3"/>
+          </a:lnRef>
+          <a:fillRef idx="0">
+            <a:schemeClr val="accent3"/>
+          </a:fillRef>
+          <a:effectRef idx="1">
+            <a:schemeClr val="accent3"/>
+          </a:effectRef>
+          <a:fontRef idx="minor">
+            <a:schemeClr val="tx1"/>
+          </a:fontRef>
+        </p:style>
+      </p:cxnSp>
+      <p:sp>
+        <p:nvSpPr>
+          <p:cNvPr id="33" name="Textfeld 32">
+            <a:extLst>
+              <a:ext uri="{FF2B5EF4-FFF2-40B4-BE49-F238E27FC236}">
+                <a16:creationId xmlns:a16="http://schemas.microsoft.com/office/drawing/2014/main" id="{60798814-5BA7-4C6B-A8BB-76F2D1891C3C}"/>
+              </a:ext>
+            </a:extLst>
+          </p:cNvPr>
+          <p:cNvSpPr txBox="1"/>
+          <p:nvPr/>
+        </p:nvSpPr>
+        <p:spPr>
+          <a:xfrm>
+            <a:off x="2123730" y="4554409"/>
+            <a:ext cx="5040556" cy="646331"/>
+          </a:xfrm>
+          <a:prstGeom prst="rect">
+            <a:avLst/>
+          </a:prstGeom>
+          <a:noFill/>
+        </p:spPr>
+        <p:txBody>
+          <a:bodyPr wrap="square" rtlCol="0">
+            <a:spAutoFit/>
+          </a:bodyPr>
+          <a:lstStyle/>
+          <a:p>
+            <a:pPr marL="285750" indent="-285750">
+              <a:buFont typeface="Arial" panose="020B0604020202020204" pitchFamily="34" charset="0"/>
+              <a:buChar char="•"/>
+            </a:pPr>
+            <a:r>
+              <a:rPr lang="de-DE" dirty="0" err="1"/>
+              <a:t>Is</a:t>
+            </a:r>
+            <a:r>
+              <a:rPr lang="de-DE" dirty="0"/>
+              <a:t> </a:t>
+            </a:r>
+            <a:r>
+              <a:rPr lang="de-DE" dirty="0" err="1"/>
+              <a:t>it</a:t>
+            </a:r>
+            <a:r>
+              <a:rPr lang="de-DE" dirty="0"/>
+              <a:t> possible to design a TF via DRL to </a:t>
+            </a:r>
+            <a:r>
+              <a:rPr lang="de-DE" dirty="0" err="1"/>
+              <a:t>increase</a:t>
+            </a:r>
+            <a:r>
+              <a:rPr lang="de-DE" dirty="0"/>
+              <a:t> UX and </a:t>
+            </a:r>
+            <a:r>
+              <a:rPr lang="de-DE" dirty="0" err="1"/>
+              <a:t>user</a:t>
+            </a:r>
+            <a:r>
+              <a:rPr lang="de-DE" dirty="0"/>
+              <a:t> </a:t>
+            </a:r>
+            <a:r>
+              <a:rPr lang="de-DE" dirty="0" err="1"/>
+              <a:t>perfomance</a:t>
+            </a:r>
+            <a:r>
+              <a:rPr lang="de-DE" dirty="0"/>
+              <a:t> in </a:t>
+            </a:r>
+            <a:r>
+              <a:rPr lang="de-DE" dirty="0" err="1"/>
+              <a:t>certain</a:t>
+            </a:r>
+            <a:r>
+              <a:rPr lang="de-DE" dirty="0"/>
+              <a:t> </a:t>
+            </a:r>
+            <a:r>
+              <a:rPr lang="de-DE" dirty="0" err="1"/>
+              <a:t>tasks</a:t>
+            </a:r>
+            <a:r>
+              <a:rPr lang="de-DE" dirty="0"/>
+              <a:t>?</a:t>
+            </a:r>
           </a:p>
         </p:txBody>
       </p:sp>

</xml_diff>

<commit_message>
added slides for intro
</commit_message>
<xml_diff>
--- a/01-topic-selection/topics/mouse-transfer-function/TransferfunctionRL.pptx
+++ b/01-topic-selection/topics/mouse-transfer-function/TransferfunctionRL.pptx
@@ -5,16 +5,17 @@
     <p:sldMasterId id="2147483648" r:id="rId1"/>
   </p:sldMasterIdLst>
   <p:notesMasterIdLst>
-    <p:notesMasterId r:id="rId6"/>
+    <p:notesMasterId r:id="rId7"/>
   </p:notesMasterIdLst>
   <p:handoutMasterIdLst>
-    <p:handoutMasterId r:id="rId7"/>
+    <p:handoutMasterId r:id="rId8"/>
   </p:handoutMasterIdLst>
   <p:sldIdLst>
     <p:sldId id="258" r:id="rId2"/>
     <p:sldId id="259" r:id="rId3"/>
     <p:sldId id="260" r:id="rId4"/>
-    <p:sldId id="261" r:id="rId5"/>
+    <p:sldId id="262" r:id="rId5"/>
+    <p:sldId id="261" r:id="rId6"/>
   </p:sldIdLst>
   <p:sldSz cx="9144000" cy="6858000" type="screen4x3"/>
   <p:notesSz cx="6858000" cy="9144000"/>
@@ -121,6 +122,7 @@
             <p14:sldId id="258"/>
             <p14:sldId id="259"/>
             <p14:sldId id="260"/>
+            <p14:sldId id="262"/>
             <p14:sldId id="261"/>
           </p14:sldIdLst>
         </p14:section>
@@ -253,7 +255,7 @@
             <a:fld id="{350B7780-B50B-474C-85C6-0B4009B6F014}" type="datetimeFigureOut">
               <a:rPr lang="de-DE" smtClean="0"/>
               <a:pPr/>
-              <a:t>01.05.2019</a:t>
+              <a:t>07.05.2019</a:t>
             </a:fld>
             <a:endParaRPr lang="de-DE"/>
           </a:p>
@@ -415,7 +417,7 @@
             <a:fld id="{19FFB102-D3AF-431C-A902-ADE5B2A48608}" type="datetimeFigureOut">
               <a:rPr lang="de-DE" smtClean="0"/>
               <a:pPr/>
-              <a:t>01.05.2019</a:t>
+              <a:t>07.05.2019</a:t>
             </a:fld>
             <a:endParaRPr lang="de-DE"/>
           </a:p>
@@ -2695,7 +2697,7 @@
           <p:cNvPr id="2" name="Titel 1">
             <a:extLst>
               <a:ext uri="{FF2B5EF4-FFF2-40B4-BE49-F238E27FC236}">
-                <a16:creationId xmlns:a16="http://schemas.microsoft.com/office/drawing/2014/main" id="{B52233C8-DAD8-443D-BB27-A05E98F2CA20}"/>
+                <a16:creationId xmlns:a16="http://schemas.microsoft.com/office/drawing/2014/main" id="{2A42FEB0-5048-4439-BF38-0C19C3532315}"/>
               </a:ext>
             </a:extLst>
           </p:cNvPr>
@@ -2712,8 +2714,416 @@
           <a:lstStyle/>
           <a:p>
             <a:r>
-              <a:rPr lang="de-DE" dirty="0"/>
-              <a:t>Background</a:t>
+              <a:rPr lang="de-DE" dirty="0" err="1"/>
+              <a:t>Being</a:t>
+            </a:r>
+            <a:r>
+              <a:rPr lang="de-DE" dirty="0"/>
+              <a:t> </a:t>
+            </a:r>
+            <a:r>
+              <a:rPr lang="de-DE" dirty="0" err="1"/>
+              <a:t>faster</a:t>
+            </a:r>
+            <a:r>
+              <a:rPr lang="de-DE" dirty="0"/>
+              <a:t> </a:t>
+            </a:r>
+            <a:r>
+              <a:rPr lang="de-DE" dirty="0" err="1"/>
+              <a:t>than</a:t>
+            </a:r>
+            <a:r>
+              <a:rPr lang="de-DE" dirty="0"/>
+              <a:t> in Real-Time</a:t>
+            </a:r>
+          </a:p>
+        </p:txBody>
+      </p:sp>
+      <p:sp>
+        <p:nvSpPr>
+          <p:cNvPr id="3" name="Inhaltsplatzhalter 2">
+            <a:extLst>
+              <a:ext uri="{FF2B5EF4-FFF2-40B4-BE49-F238E27FC236}">
+                <a16:creationId xmlns:a16="http://schemas.microsoft.com/office/drawing/2014/main" id="{03FEB977-598D-486E-84D8-0D0D6281A22B}"/>
+              </a:ext>
+            </a:extLst>
+          </p:cNvPr>
+          <p:cNvSpPr>
+            <a:spLocks noGrp="1"/>
+          </p:cNvSpPr>
+          <p:nvPr>
+            <p:ph sz="half" idx="1"/>
+          </p:nvPr>
+        </p:nvSpPr>
+        <p:spPr/>
+        <p:txBody>
+          <a:bodyPr>
+            <a:normAutofit fontScale="92500" lnSpcReduction="10000"/>
+          </a:bodyPr>
+          <a:lstStyle/>
+          <a:p>
+            <a:pPr>
+              <a:buFont typeface="Arial" panose="020B0604020202020204" pitchFamily="34" charset="0"/>
+              <a:buChar char="•"/>
+            </a:pPr>
+            <a:r>
+              <a:rPr lang="de-DE" dirty="0" err="1"/>
+              <a:t>Predicting</a:t>
+            </a:r>
+            <a:r>
+              <a:rPr lang="de-DE" dirty="0"/>
+              <a:t> </a:t>
+            </a:r>
+            <a:r>
+              <a:rPr lang="de-DE" dirty="0" err="1"/>
+              <a:t>avatar</a:t>
+            </a:r>
+            <a:r>
+              <a:rPr lang="de-DE" dirty="0"/>
+              <a:t> </a:t>
+            </a:r>
+            <a:r>
+              <a:rPr lang="de-DE" dirty="0" err="1"/>
+              <a:t>movement</a:t>
+            </a:r>
+            <a:r>
+              <a:rPr lang="de-DE" dirty="0"/>
+              <a:t> in VR</a:t>
+            </a:r>
+          </a:p>
+          <a:p>
+            <a:pPr lvl="1">
+              <a:buFont typeface="Arial" panose="020B0604020202020204" pitchFamily="34" charset="0"/>
+              <a:buChar char="•"/>
+            </a:pPr>
+            <a:r>
+              <a:rPr lang="de-DE" dirty="0" err="1"/>
+              <a:t>Increase</a:t>
+            </a:r>
+            <a:r>
+              <a:rPr lang="de-DE" dirty="0"/>
+              <a:t>  </a:t>
+            </a:r>
+            <a:r>
+              <a:rPr lang="de-DE" dirty="0" err="1"/>
+              <a:t>perfomance</a:t>
+            </a:r>
+            <a:r>
+              <a:rPr lang="de-DE" dirty="0"/>
+              <a:t> </a:t>
+            </a:r>
+          </a:p>
+          <a:p>
+            <a:pPr lvl="1">
+              <a:buFont typeface="Arial" panose="020B0604020202020204" pitchFamily="34" charset="0"/>
+              <a:buChar char="•"/>
+            </a:pPr>
+            <a:r>
+              <a:rPr lang="de-DE" dirty="0" err="1"/>
+              <a:t>Increase</a:t>
+            </a:r>
+            <a:r>
+              <a:rPr lang="de-DE" dirty="0"/>
+              <a:t> </a:t>
+            </a:r>
+            <a:r>
+              <a:rPr lang="de-DE" dirty="0" err="1"/>
+              <a:t>immersion</a:t>
+            </a:r>
+            <a:r>
+              <a:rPr lang="de-DE" dirty="0"/>
+              <a:t> </a:t>
+            </a:r>
+            <a:r>
+              <a:rPr lang="de-DE" dirty="0" err="1"/>
+              <a:t>of</a:t>
+            </a:r>
+            <a:r>
+              <a:rPr lang="de-DE" dirty="0"/>
+              <a:t> </a:t>
+            </a:r>
+            <a:r>
+              <a:rPr lang="de-DE" dirty="0" err="1"/>
+              <a:t>body</a:t>
+            </a:r>
+            <a:r>
+              <a:rPr lang="de-DE" dirty="0"/>
+              <a:t> </a:t>
+            </a:r>
+            <a:r>
+              <a:rPr lang="de-DE" dirty="0" err="1"/>
+              <a:t>perception</a:t>
+            </a:r>
+            <a:endParaRPr lang="de-DE" dirty="0"/>
+          </a:p>
+          <a:p>
+            <a:pPr lvl="1">
+              <a:buFont typeface="Arial" panose="020B0604020202020204" pitchFamily="34" charset="0"/>
+              <a:buChar char="•"/>
+            </a:pPr>
+            <a:r>
+              <a:rPr lang="de-DE" dirty="0"/>
+              <a:t>Tackle </a:t>
+            </a:r>
+            <a:r>
+              <a:rPr lang="de-DE" dirty="0" err="1"/>
+              <a:t>latency</a:t>
+            </a:r>
+            <a:r>
+              <a:rPr lang="de-DE" dirty="0"/>
+              <a:t> </a:t>
+            </a:r>
+          </a:p>
+          <a:p>
+            <a:pPr lvl="1">
+              <a:buFont typeface="Arial" panose="020B0604020202020204" pitchFamily="34" charset="0"/>
+              <a:buChar char="•"/>
+            </a:pPr>
+            <a:endParaRPr lang="de-DE" dirty="0"/>
+          </a:p>
+          <a:p>
+            <a:pPr lvl="1">
+              <a:buFont typeface="Arial" panose="020B0604020202020204" pitchFamily="34" charset="0"/>
+              <a:buChar char="•"/>
+            </a:pPr>
+            <a:endParaRPr lang="de-DE" dirty="0"/>
+          </a:p>
+          <a:p>
+            <a:pPr>
+              <a:buFont typeface="Arial" panose="020B0604020202020204" pitchFamily="34" charset="0"/>
+              <a:buChar char="•"/>
+            </a:pPr>
+            <a:r>
+              <a:rPr lang="de-DE" dirty="0" err="1"/>
+              <a:t>Apply</a:t>
+            </a:r>
+            <a:r>
+              <a:rPr lang="de-DE" dirty="0"/>
+              <a:t> </a:t>
+            </a:r>
+            <a:r>
+              <a:rPr lang="de-DE" dirty="0" err="1"/>
+              <a:t>prediction</a:t>
+            </a:r>
+            <a:r>
+              <a:rPr lang="de-DE" dirty="0"/>
+              <a:t> </a:t>
+            </a:r>
+            <a:r>
+              <a:rPr lang="de-DE" dirty="0" err="1"/>
+              <a:t>to</a:t>
+            </a:r>
+            <a:r>
+              <a:rPr lang="de-DE" dirty="0"/>
+              <a:t> virtual </a:t>
+            </a:r>
+            <a:r>
+              <a:rPr lang="de-DE" dirty="0" err="1"/>
+              <a:t>Avater</a:t>
+            </a:r>
+            <a:endParaRPr lang="de-DE" dirty="0"/>
+          </a:p>
+          <a:p>
+            <a:pPr lvl="1">
+              <a:buFont typeface="Arial" panose="020B0604020202020204" pitchFamily="34" charset="0"/>
+              <a:buChar char="•"/>
+            </a:pPr>
+            <a:endParaRPr lang="de-DE" dirty="0"/>
+          </a:p>
+          <a:p>
+            <a:pPr marL="342900">
+              <a:buFont typeface="Arial" panose="020B0604020202020204" pitchFamily="34" charset="0"/>
+              <a:buChar char="•"/>
+            </a:pPr>
+            <a:r>
+              <a:rPr lang="de-DE" dirty="0" err="1"/>
+              <a:t>Recent</a:t>
+            </a:r>
+            <a:r>
+              <a:rPr lang="de-DE" dirty="0"/>
+              <a:t> </a:t>
+            </a:r>
+            <a:r>
+              <a:rPr lang="de-DE" dirty="0" err="1"/>
+              <a:t>work</a:t>
+            </a:r>
+            <a:r>
+              <a:rPr lang="de-DE" dirty="0"/>
+              <a:t> </a:t>
+            </a:r>
+            <a:r>
+              <a:rPr lang="de-DE" dirty="0" err="1"/>
+              <a:t>shows</a:t>
+            </a:r>
+            <a:r>
+              <a:rPr lang="de-DE" dirty="0"/>
+              <a:t> </a:t>
+            </a:r>
+            <a:r>
+              <a:rPr lang="de-DE" dirty="0" err="1"/>
+              <a:t>feasibility</a:t>
+            </a:r>
+            <a:r>
+              <a:rPr lang="de-DE" dirty="0"/>
+              <a:t> </a:t>
+            </a:r>
+            <a:r>
+              <a:rPr lang="de-DE" dirty="0" err="1"/>
+              <a:t>of</a:t>
+            </a:r>
+            <a:r>
+              <a:rPr lang="de-DE" dirty="0"/>
+              <a:t> </a:t>
+            </a:r>
+            <a:r>
+              <a:rPr lang="de-DE" dirty="0" err="1"/>
+              <a:t>this</a:t>
+            </a:r>
+            <a:r>
+              <a:rPr lang="de-DE" dirty="0"/>
+              <a:t> </a:t>
+            </a:r>
+            <a:r>
+              <a:rPr lang="de-DE" dirty="0" err="1"/>
+              <a:t>approach</a:t>
+            </a:r>
+            <a:r>
+              <a:rPr lang="de-DE" dirty="0"/>
+              <a:t> [1]</a:t>
+            </a:r>
+          </a:p>
+          <a:p>
+            <a:pPr marL="342900">
+              <a:buFont typeface="Arial" panose="020B0604020202020204" pitchFamily="34" charset="0"/>
+              <a:buChar char="•"/>
+            </a:pPr>
+            <a:endParaRPr lang="de-DE" dirty="0"/>
+          </a:p>
+          <a:p>
+            <a:pPr marL="342900">
+              <a:buFont typeface="Arial" panose="020B0604020202020204" pitchFamily="34" charset="0"/>
+              <a:buChar char="•"/>
+            </a:pPr>
+            <a:endParaRPr lang="de-DE" dirty="0"/>
+          </a:p>
+          <a:p>
+            <a:pPr marL="342900">
+              <a:buFont typeface="Arial" panose="020B0604020202020204" pitchFamily="34" charset="0"/>
+              <a:buChar char="•"/>
+            </a:pPr>
+            <a:endParaRPr lang="de-DE" dirty="0"/>
+          </a:p>
+          <a:p>
+            <a:pPr marL="342900">
+              <a:buFont typeface="Arial" panose="020B0604020202020204" pitchFamily="34" charset="0"/>
+              <a:buChar char="•"/>
+            </a:pPr>
+            <a:endParaRPr lang="de-DE" dirty="0"/>
+          </a:p>
+          <a:p>
+            <a:pPr marL="342900">
+              <a:buFont typeface="Arial" panose="020B0604020202020204" pitchFamily="34" charset="0"/>
+              <a:buChar char="•"/>
+            </a:pPr>
+            <a:endParaRPr lang="de-DE" dirty="0"/>
+          </a:p>
+          <a:p>
+            <a:pPr marL="342900">
+              <a:buFont typeface="Arial" panose="020B0604020202020204" pitchFamily="34" charset="0"/>
+              <a:buChar char="•"/>
+            </a:pPr>
+            <a:r>
+              <a:rPr lang="de-DE" sz="1100" dirty="0"/>
+              <a:t>[1] </a:t>
+            </a:r>
+            <a:r>
+              <a:rPr lang="de-DE" sz="1100" dirty="0" err="1"/>
+              <a:t>Huy</a:t>
+            </a:r>
+            <a:r>
+              <a:rPr lang="de-DE" sz="1100" dirty="0"/>
+              <a:t> </a:t>
+            </a:r>
+            <a:r>
+              <a:rPr lang="de-DE" sz="1100" dirty="0" err="1"/>
+              <a:t>Viet</a:t>
+            </a:r>
+            <a:r>
+              <a:rPr lang="de-DE" sz="1100" dirty="0"/>
+              <a:t> Le, Valentin Schwind, Philipp Göttlich, and Niels Henze. 2017. </a:t>
+            </a:r>
+            <a:r>
+              <a:rPr lang="de-DE" sz="1100" dirty="0" err="1"/>
+              <a:t>PredicTouch</a:t>
+            </a:r>
+            <a:r>
+              <a:rPr lang="de-DE" sz="1100" dirty="0"/>
+              <a:t>: A System </a:t>
+            </a:r>
+            <a:r>
+              <a:rPr lang="de-DE" sz="1100" dirty="0" err="1"/>
+              <a:t>to</a:t>
+            </a:r>
+            <a:r>
+              <a:rPr lang="de-DE" sz="1100" dirty="0"/>
+              <a:t> </a:t>
+            </a:r>
+            <a:r>
+              <a:rPr lang="de-DE" sz="1100" dirty="0" err="1"/>
+              <a:t>Reduce</a:t>
+            </a:r>
+            <a:r>
+              <a:rPr lang="de-DE" sz="1100" dirty="0"/>
+              <a:t> Touchscreen </a:t>
+            </a:r>
+            <a:r>
+              <a:rPr lang="de-DE" sz="1100" dirty="0" err="1"/>
+              <a:t>Latency</a:t>
+            </a:r>
+            <a:r>
+              <a:rPr lang="de-DE" sz="1100" dirty="0"/>
+              <a:t> </a:t>
+            </a:r>
+            <a:r>
+              <a:rPr lang="de-DE" sz="1100" dirty="0" err="1"/>
+              <a:t>using</a:t>
+            </a:r>
+            <a:r>
+              <a:rPr lang="de-DE" sz="1100" dirty="0"/>
+              <a:t> </a:t>
+            </a:r>
+            <a:r>
+              <a:rPr lang="de-DE" sz="1100" dirty="0" err="1"/>
+              <a:t>Neural</a:t>
+            </a:r>
+            <a:r>
+              <a:rPr lang="de-DE" sz="1100" dirty="0"/>
+              <a:t> Networks and Inertial Measurement Units. In Proceedings </a:t>
+            </a:r>
+            <a:r>
+              <a:rPr lang="de-DE" sz="1100" dirty="0" err="1"/>
+              <a:t>of</a:t>
+            </a:r>
+            <a:r>
+              <a:rPr lang="de-DE" sz="1100" dirty="0"/>
+              <a:t> </a:t>
+            </a:r>
+            <a:r>
+              <a:rPr lang="de-DE" sz="1100" dirty="0" err="1"/>
+              <a:t>the</a:t>
+            </a:r>
+            <a:r>
+              <a:rPr lang="de-DE" sz="1100" dirty="0"/>
+              <a:t> 2017 ACM International Conference on Interactive </a:t>
+            </a:r>
+            <a:r>
+              <a:rPr lang="de-DE" sz="1100" dirty="0" err="1"/>
+              <a:t>Surfaces</a:t>
+            </a:r>
+            <a:r>
+              <a:rPr lang="de-DE" sz="1100" dirty="0"/>
+              <a:t> and Spaces (ISS '17). ACM, New York, NY, USA, 230-239. DOI: https://doi.org/10.1145/3132272.3134138</a:t>
             </a:r>
           </a:p>
         </p:txBody>
@@ -2723,7 +3133,7 @@
           <p:cNvPr id="4" name="Foliennummernplatzhalter 3">
             <a:extLst>
               <a:ext uri="{FF2B5EF4-FFF2-40B4-BE49-F238E27FC236}">
-                <a16:creationId xmlns:a16="http://schemas.microsoft.com/office/drawing/2014/main" id="{B59A24B8-C35B-4F70-8D4D-FCB6F9A5905B}"/>
+                <a16:creationId xmlns:a16="http://schemas.microsoft.com/office/drawing/2014/main" id="{4FCFF55B-CB17-417D-97C3-58B0E9907247}"/>
               </a:ext>
             </a:extLst>
           </p:cNvPr>
@@ -2747,368 +3157,10 @@
           </a:p>
         </p:txBody>
       </p:sp>
-      <p:sp>
-        <p:nvSpPr>
-          <p:cNvPr id="5" name="Rechteck: abgerundete Ecken 4">
-            <a:extLst>
-              <a:ext uri="{FF2B5EF4-FFF2-40B4-BE49-F238E27FC236}">
-                <a16:creationId xmlns:a16="http://schemas.microsoft.com/office/drawing/2014/main" id="{AC9A8BAF-F578-428C-BAFC-A5C77D2F7814}"/>
-              </a:ext>
-            </a:extLst>
-          </p:cNvPr>
-          <p:cNvSpPr/>
-          <p:nvPr/>
-        </p:nvSpPr>
-        <p:spPr>
-          <a:xfrm>
-            <a:off x="2709139" y="2420888"/>
-            <a:ext cx="792088" cy="438800"/>
-          </a:xfrm>
-          <a:prstGeom prst="roundRect">
-            <a:avLst/>
-          </a:prstGeom>
-        </p:spPr>
-        <p:style>
-          <a:lnRef idx="2">
-            <a:schemeClr val="accent1">
-              <a:shade val="50000"/>
-            </a:schemeClr>
-          </a:lnRef>
-          <a:fillRef idx="1">
-            <a:schemeClr val="accent1"/>
-          </a:fillRef>
-          <a:effectRef idx="0">
-            <a:schemeClr val="accent1"/>
-          </a:effectRef>
-          <a:fontRef idx="minor">
-            <a:schemeClr val="lt1"/>
-          </a:fontRef>
-        </p:style>
-        <p:txBody>
-          <a:bodyPr rtlCol="0" anchor="ctr"/>
-          <a:lstStyle/>
-          <a:p>
-            <a:pPr algn="ctr"/>
-            <a:r>
-              <a:rPr lang="de-DE" dirty="0"/>
-              <a:t>Input</a:t>
-            </a:r>
-          </a:p>
-        </p:txBody>
-      </p:sp>
-      <p:sp>
-        <p:nvSpPr>
-          <p:cNvPr id="6" name="Rechteck: abgerundete Ecken 5">
-            <a:extLst>
-              <a:ext uri="{FF2B5EF4-FFF2-40B4-BE49-F238E27FC236}">
-                <a16:creationId xmlns:a16="http://schemas.microsoft.com/office/drawing/2014/main" id="{C52A7B1E-E781-4C26-BEFC-0B373E103407}"/>
-              </a:ext>
-            </a:extLst>
-          </p:cNvPr>
-          <p:cNvSpPr/>
-          <p:nvPr/>
-        </p:nvSpPr>
-        <p:spPr>
-          <a:xfrm>
-            <a:off x="4139952" y="2420888"/>
-            <a:ext cx="792088" cy="438800"/>
-          </a:xfrm>
-          <a:prstGeom prst="roundRect">
-            <a:avLst/>
-          </a:prstGeom>
-        </p:spPr>
-        <p:style>
-          <a:lnRef idx="2">
-            <a:schemeClr val="accent1">
-              <a:shade val="50000"/>
-            </a:schemeClr>
-          </a:lnRef>
-          <a:fillRef idx="1">
-            <a:schemeClr val="accent1"/>
-          </a:fillRef>
-          <a:effectRef idx="0">
-            <a:schemeClr val="accent1"/>
-          </a:effectRef>
-          <a:fontRef idx="minor">
-            <a:schemeClr val="lt1"/>
-          </a:fontRef>
-        </p:style>
-        <p:txBody>
-          <a:bodyPr rtlCol="0" anchor="ctr"/>
-          <a:lstStyle/>
-          <a:p>
-            <a:pPr algn="ctr"/>
-            <a:r>
-              <a:rPr lang="de-DE" dirty="0"/>
-              <a:t>TF</a:t>
-            </a:r>
-          </a:p>
-        </p:txBody>
-      </p:sp>
-      <p:sp>
-        <p:nvSpPr>
-          <p:cNvPr id="7" name="Rechteck: abgerundete Ecken 6">
-            <a:extLst>
-              <a:ext uri="{FF2B5EF4-FFF2-40B4-BE49-F238E27FC236}">
-                <a16:creationId xmlns:a16="http://schemas.microsoft.com/office/drawing/2014/main" id="{69D3576C-7B28-4122-939B-D18F1C1D8D2D}"/>
-              </a:ext>
-            </a:extLst>
-          </p:cNvPr>
-          <p:cNvSpPr/>
-          <p:nvPr/>
-        </p:nvSpPr>
-        <p:spPr>
-          <a:xfrm>
-            <a:off x="5570765" y="2420888"/>
-            <a:ext cx="792088" cy="438800"/>
-          </a:xfrm>
-          <a:prstGeom prst="roundRect">
-            <a:avLst/>
-          </a:prstGeom>
-        </p:spPr>
-        <p:style>
-          <a:lnRef idx="2">
-            <a:schemeClr val="accent1">
-              <a:shade val="50000"/>
-            </a:schemeClr>
-          </a:lnRef>
-          <a:fillRef idx="1">
-            <a:schemeClr val="accent1"/>
-          </a:fillRef>
-          <a:effectRef idx="0">
-            <a:schemeClr val="accent1"/>
-          </a:effectRef>
-          <a:fontRef idx="minor">
-            <a:schemeClr val="lt1"/>
-          </a:fontRef>
-        </p:style>
-        <p:txBody>
-          <a:bodyPr rtlCol="0" anchor="ctr"/>
-          <a:lstStyle/>
-          <a:p>
-            <a:pPr algn="ctr"/>
-            <a:r>
-              <a:rPr lang="de-DE" sz="1400" dirty="0"/>
-              <a:t>Output</a:t>
-            </a:r>
-          </a:p>
-        </p:txBody>
-      </p:sp>
-      <p:cxnSp>
-        <p:nvCxnSpPr>
-          <p:cNvPr id="9" name="Gerade Verbindung mit Pfeil 8">
-            <a:extLst>
-              <a:ext uri="{FF2B5EF4-FFF2-40B4-BE49-F238E27FC236}">
-                <a16:creationId xmlns:a16="http://schemas.microsoft.com/office/drawing/2014/main" id="{D52FC37E-A5C5-47A6-9FCA-241EB9925BE3}"/>
-              </a:ext>
-            </a:extLst>
-          </p:cNvPr>
-          <p:cNvCxnSpPr>
-            <a:cxnSpLocks/>
-            <a:stCxn id="5" idx="3"/>
-            <a:endCxn id="6" idx="1"/>
-          </p:cNvCxnSpPr>
-          <p:nvPr/>
-        </p:nvCxnSpPr>
-        <p:spPr>
-          <a:xfrm>
-            <a:off x="3501227" y="2640288"/>
-            <a:ext cx="638725" cy="0"/>
-          </a:xfrm>
-          <a:prstGeom prst="straightConnector1">
-            <a:avLst/>
-          </a:prstGeom>
-          <a:ln>
-            <a:tailEnd type="triangle"/>
-          </a:ln>
-        </p:spPr>
-        <p:style>
-          <a:lnRef idx="2">
-            <a:schemeClr val="accent1"/>
-          </a:lnRef>
-          <a:fillRef idx="0">
-            <a:schemeClr val="accent1"/>
-          </a:fillRef>
-          <a:effectRef idx="1">
-            <a:schemeClr val="accent1"/>
-          </a:effectRef>
-          <a:fontRef idx="minor">
-            <a:schemeClr val="tx1"/>
-          </a:fontRef>
-        </p:style>
-      </p:cxnSp>
-      <p:cxnSp>
-        <p:nvCxnSpPr>
-          <p:cNvPr id="10" name="Gerade Verbindung mit Pfeil 9">
-            <a:extLst>
-              <a:ext uri="{FF2B5EF4-FFF2-40B4-BE49-F238E27FC236}">
-                <a16:creationId xmlns:a16="http://schemas.microsoft.com/office/drawing/2014/main" id="{5D2F5330-71D9-4B35-AF30-BCE4EEC82825}"/>
-              </a:ext>
-            </a:extLst>
-          </p:cNvPr>
-          <p:cNvCxnSpPr>
-            <a:cxnSpLocks/>
-            <a:stCxn id="6" idx="3"/>
-          </p:cNvCxnSpPr>
-          <p:nvPr/>
-        </p:nvCxnSpPr>
-        <p:spPr>
-          <a:xfrm>
-            <a:off x="4932040" y="2640288"/>
-            <a:ext cx="638725" cy="0"/>
-          </a:xfrm>
-          <a:prstGeom prst="straightConnector1">
-            <a:avLst/>
-          </a:prstGeom>
-          <a:ln>
-            <a:tailEnd type="triangle"/>
-          </a:ln>
-        </p:spPr>
-        <p:style>
-          <a:lnRef idx="2">
-            <a:schemeClr val="accent1"/>
-          </a:lnRef>
-          <a:fillRef idx="0">
-            <a:schemeClr val="accent1"/>
-          </a:fillRef>
-          <a:effectRef idx="1">
-            <a:schemeClr val="accent1"/>
-          </a:effectRef>
-          <a:fontRef idx="minor">
-            <a:schemeClr val="tx1"/>
-          </a:fontRef>
-        </p:style>
-      </p:cxnSp>
-      <p:cxnSp>
-        <p:nvCxnSpPr>
-          <p:cNvPr id="12" name="Gerade Verbindung mit Pfeil 11">
-            <a:extLst>
-              <a:ext uri="{FF2B5EF4-FFF2-40B4-BE49-F238E27FC236}">
-                <a16:creationId xmlns:a16="http://schemas.microsoft.com/office/drawing/2014/main" id="{569F89D3-3306-480C-9D32-4107BDB73328}"/>
-              </a:ext>
-            </a:extLst>
-          </p:cNvPr>
-          <p:cNvCxnSpPr>
-            <a:cxnSpLocks/>
-            <a:stCxn id="6" idx="2"/>
-          </p:cNvCxnSpPr>
-          <p:nvPr/>
-        </p:nvCxnSpPr>
-        <p:spPr>
-          <a:xfrm>
-            <a:off x="4535996" y="2859688"/>
-            <a:ext cx="0" cy="785336"/>
-          </a:xfrm>
-          <a:prstGeom prst="straightConnector1">
-            <a:avLst/>
-          </a:prstGeom>
-          <a:ln>
-            <a:tailEnd type="triangle"/>
-          </a:ln>
-        </p:spPr>
-        <p:style>
-          <a:lnRef idx="2">
-            <a:schemeClr val="accent1"/>
-          </a:lnRef>
-          <a:fillRef idx="0">
-            <a:schemeClr val="accent1"/>
-          </a:fillRef>
-          <a:effectRef idx="1">
-            <a:schemeClr val="accent1"/>
-          </a:effectRef>
-          <a:fontRef idx="minor">
-            <a:schemeClr val="tx1"/>
-          </a:fontRef>
-        </p:style>
-      </p:cxnSp>
-      <p:sp>
-        <p:nvSpPr>
-          <p:cNvPr id="19" name="Textfeld 18">
-            <a:extLst>
-              <a:ext uri="{FF2B5EF4-FFF2-40B4-BE49-F238E27FC236}">
-                <a16:creationId xmlns:a16="http://schemas.microsoft.com/office/drawing/2014/main" id="{E5CC840F-FBD4-41C7-BD15-991D9603A4DC}"/>
-              </a:ext>
-            </a:extLst>
-          </p:cNvPr>
-          <p:cNvSpPr txBox="1"/>
-          <p:nvPr/>
-        </p:nvSpPr>
-        <p:spPr>
-          <a:xfrm>
-            <a:off x="2339752" y="3678698"/>
-            <a:ext cx="5040556" cy="646331"/>
-          </a:xfrm>
-          <a:prstGeom prst="rect">
-            <a:avLst/>
-          </a:prstGeom>
-          <a:noFill/>
-        </p:spPr>
-        <p:txBody>
-          <a:bodyPr wrap="square" rtlCol="0">
-            <a:spAutoFit/>
-          </a:bodyPr>
-          <a:lstStyle/>
-          <a:p>
-            <a:pPr marL="285750" indent="-285750">
-              <a:buFont typeface="Arial" panose="020B0604020202020204" pitchFamily="34" charset="0"/>
-              <a:buChar char="•"/>
-            </a:pPr>
-            <a:r>
-              <a:rPr lang="de-DE" dirty="0"/>
-              <a:t>Mapping </a:t>
-            </a:r>
-            <a:r>
-              <a:rPr lang="de-DE" dirty="0" err="1"/>
-              <a:t>movement</a:t>
-            </a:r>
-            <a:r>
-              <a:rPr lang="de-DE" dirty="0"/>
-              <a:t> in real </a:t>
-            </a:r>
-            <a:r>
-              <a:rPr lang="de-DE" dirty="0" err="1"/>
-              <a:t>world</a:t>
-            </a:r>
-            <a:r>
-              <a:rPr lang="de-DE" dirty="0"/>
-              <a:t> </a:t>
-            </a:r>
-            <a:r>
-              <a:rPr lang="de-DE" dirty="0" err="1"/>
-              <a:t>space</a:t>
-            </a:r>
-            <a:r>
-              <a:rPr lang="de-DE" dirty="0"/>
-              <a:t> to </a:t>
-            </a:r>
-            <a:r>
-              <a:rPr lang="de-DE" dirty="0" err="1"/>
-              <a:t>computer</a:t>
-            </a:r>
-            <a:r>
-              <a:rPr lang="de-DE" dirty="0"/>
-              <a:t> </a:t>
-            </a:r>
-            <a:r>
-              <a:rPr lang="de-DE" dirty="0" err="1"/>
-              <a:t>space</a:t>
-            </a:r>
-            <a:r>
-              <a:rPr lang="de-DE" dirty="0"/>
-              <a:t> </a:t>
-            </a:r>
-            <a:r>
-              <a:rPr lang="de-DE" dirty="0" err="1"/>
-              <a:t>representation</a:t>
-            </a:r>
-            <a:endParaRPr lang="de-DE" dirty="0"/>
-          </a:p>
-        </p:txBody>
-      </p:sp>
     </p:spTree>
     <p:extLst>
       <p:ext uri="{BB962C8B-B14F-4D97-AF65-F5344CB8AC3E}">
-        <p14:creationId xmlns:p14="http://schemas.microsoft.com/office/powerpoint/2010/main" val="998249992"/>
+        <p14:creationId xmlns:p14="http://schemas.microsoft.com/office/powerpoint/2010/main" val="1283930123"/>
       </p:ext>
     </p:extLst>
   </p:cSld>
@@ -3140,7 +3192,7 @@
           <p:cNvPr id="2" name="Titel 1">
             <a:extLst>
               <a:ext uri="{FF2B5EF4-FFF2-40B4-BE49-F238E27FC236}">
-                <a16:creationId xmlns:a16="http://schemas.microsoft.com/office/drawing/2014/main" id="{B52233C8-DAD8-443D-BB27-A05E98F2CA20}"/>
+                <a16:creationId xmlns:a16="http://schemas.microsoft.com/office/drawing/2014/main" id="{43696BFB-F0F4-4C20-BE5F-0DE2A8CA8620}"/>
               </a:ext>
             </a:extLst>
           </p:cNvPr>
@@ -3158,322 +3210,53 @@
           <a:p>
             <a:r>
               <a:rPr lang="de-DE" dirty="0" err="1"/>
-              <a:t>Previous</a:t>
-            </a:r>
-            <a:r>
-              <a:rPr lang="de-DE" dirty="0"/>
-              <a:t> </a:t>
-            </a:r>
-            <a:r>
-              <a:rPr lang="de-DE" dirty="0" err="1"/>
-              <a:t>work</a:t>
+              <a:t>Enviroment</a:t>
             </a:r>
             <a:endParaRPr lang="de-DE" dirty="0"/>
           </a:p>
         </p:txBody>
       </p:sp>
-      <p:sp>
-        <p:nvSpPr>
-          <p:cNvPr id="3" name="Inhaltsplatzhalter 2">
+      <p:pic>
+        <p:nvPicPr>
+          <p:cNvPr id="6" name="Inhaltsplatzhalter 5" descr="Ein Bild, das Himmel, draußen, Wasser, Gebäude enthält.&#10;&#10;Automatisch generierte Beschreibung">
             <a:extLst>
               <a:ext uri="{FF2B5EF4-FFF2-40B4-BE49-F238E27FC236}">
-                <a16:creationId xmlns:a16="http://schemas.microsoft.com/office/drawing/2014/main" id="{7CCBE423-4A1D-4087-9086-57A632B1DCD9}"/>
+                <a16:creationId xmlns:a16="http://schemas.microsoft.com/office/drawing/2014/main" id="{AA42878D-F6B3-48E4-9B56-543F170E7A0D}"/>
               </a:ext>
             </a:extLst>
           </p:cNvPr>
-          <p:cNvSpPr>
-            <a:spLocks noGrp="1"/>
-          </p:cNvSpPr>
+          <p:cNvPicPr>
+            <a:picLocks noGrp="1" noChangeAspect="1"/>
+          </p:cNvPicPr>
           <p:nvPr>
             <p:ph sz="half" idx="1"/>
           </p:nvPr>
-        </p:nvSpPr>
+        </p:nvPicPr>
+        <p:blipFill>
+          <a:blip r:embed="rId2">
+            <a:extLst>
+              <a:ext uri="{28A0092B-C50C-407E-A947-70E740481C1C}">
+                <a14:useLocalDpi xmlns:a14="http://schemas.microsoft.com/office/drawing/2010/main" val="0"/>
+              </a:ext>
+            </a:extLst>
+          </a:blip>
+          <a:stretch>
+            <a:fillRect/>
+          </a:stretch>
+        </p:blipFill>
         <p:spPr>
           <a:xfrm>
-            <a:off x="1331640" y="2340000"/>
-            <a:ext cx="7200800" cy="2961208"/>
+            <a:off x="1115616" y="2564904"/>
+            <a:ext cx="7200900" cy="2368717"/>
           </a:xfrm>
         </p:spPr>
-        <p:txBody>
-          <a:bodyPr/>
-          <a:lstStyle/>
-          <a:p>
-            <a:pPr>
-              <a:buFont typeface="Arial" panose="020B0604020202020204" pitchFamily="34" charset="0"/>
-              <a:buChar char="•"/>
-            </a:pPr>
-            <a:r>
-              <a:rPr lang="de-DE" dirty="0" err="1"/>
-              <a:t>Has</a:t>
-            </a:r>
-            <a:r>
-              <a:rPr lang="de-DE" dirty="0"/>
-              <a:t> </a:t>
-            </a:r>
-            <a:r>
-              <a:rPr lang="de-DE" dirty="0" err="1"/>
-              <a:t>shown</a:t>
-            </a:r>
-            <a:r>
-              <a:rPr lang="de-DE" dirty="0"/>
-              <a:t> </a:t>
-            </a:r>
-            <a:r>
-              <a:rPr lang="de-DE" dirty="0" err="1"/>
-              <a:t>that</a:t>
-            </a:r>
-            <a:r>
-              <a:rPr lang="de-DE" dirty="0"/>
-              <a:t> </a:t>
-            </a:r>
-            <a:r>
-              <a:rPr lang="de-DE" dirty="0" err="1"/>
-              <a:t>the</a:t>
-            </a:r>
-            <a:r>
-              <a:rPr lang="de-DE" dirty="0"/>
-              <a:t> </a:t>
-            </a:r>
-            <a:r>
-              <a:rPr lang="de-DE" dirty="0" err="1"/>
-              <a:t>use</a:t>
-            </a:r>
-            <a:r>
-              <a:rPr lang="de-DE" dirty="0"/>
-              <a:t> of </a:t>
-            </a:r>
-            <a:r>
-              <a:rPr lang="de-DE" dirty="0" err="1"/>
-              <a:t>the</a:t>
-            </a:r>
-            <a:r>
-              <a:rPr lang="de-DE" dirty="0"/>
-              <a:t> </a:t>
-            </a:r>
-            <a:r>
-              <a:rPr lang="de-DE" dirty="0" err="1"/>
-              <a:t>default</a:t>
-            </a:r>
-            <a:r>
-              <a:rPr lang="de-DE" dirty="0"/>
-              <a:t> TF in </a:t>
-            </a:r>
-            <a:r>
-              <a:rPr lang="de-DE" dirty="0" err="1"/>
-              <a:t>common</a:t>
-            </a:r>
-            <a:r>
-              <a:rPr lang="de-DE" dirty="0"/>
-              <a:t> </a:t>
-            </a:r>
-            <a:r>
-              <a:rPr lang="de-DE" dirty="0" err="1"/>
-              <a:t>os</a:t>
-            </a:r>
-            <a:r>
-              <a:rPr lang="de-DE" dirty="0"/>
-              <a:t> </a:t>
-            </a:r>
-            <a:r>
-              <a:rPr lang="de-DE" dirty="0" err="1"/>
-              <a:t>is</a:t>
-            </a:r>
-            <a:r>
-              <a:rPr lang="de-DE" dirty="0"/>
-              <a:t> superior to </a:t>
-            </a:r>
-            <a:r>
-              <a:rPr lang="de-DE" dirty="0" err="1"/>
-              <a:t>constant</a:t>
-            </a:r>
-            <a:r>
-              <a:rPr lang="de-DE" dirty="0"/>
-              <a:t> CD-Gain [1]</a:t>
-            </a:r>
-          </a:p>
-          <a:p>
-            <a:pPr>
-              <a:buFont typeface="Arial" panose="020B0604020202020204" pitchFamily="34" charset="0"/>
-              <a:buChar char="•"/>
-            </a:pPr>
-            <a:endParaRPr lang="de-DE" dirty="0"/>
-          </a:p>
-          <a:p>
-            <a:pPr>
-              <a:buFont typeface="Arial" panose="020B0604020202020204" pitchFamily="34" charset="0"/>
-              <a:buChar char="•"/>
-            </a:pPr>
-            <a:r>
-              <a:rPr lang="de-DE" dirty="0"/>
-              <a:t>DRL </a:t>
-            </a:r>
-            <a:r>
-              <a:rPr lang="de-DE" dirty="0" err="1"/>
-              <a:t>is</a:t>
-            </a:r>
-            <a:r>
-              <a:rPr lang="de-DE" dirty="0"/>
-              <a:t> promising in </a:t>
-            </a:r>
-            <a:r>
-              <a:rPr lang="de-DE" dirty="0" err="1"/>
-              <a:t>solving</a:t>
-            </a:r>
-            <a:r>
-              <a:rPr lang="de-DE" dirty="0"/>
-              <a:t> </a:t>
-            </a:r>
-            <a:r>
-              <a:rPr lang="de-DE" dirty="0" err="1"/>
-              <a:t>certain</a:t>
-            </a:r>
-            <a:r>
-              <a:rPr lang="de-DE" dirty="0"/>
-              <a:t> </a:t>
-            </a:r>
-            <a:r>
-              <a:rPr lang="de-DE" dirty="0" err="1"/>
-              <a:t>task</a:t>
-            </a:r>
-            <a:r>
-              <a:rPr lang="de-DE" dirty="0"/>
-              <a:t>, </a:t>
-            </a:r>
-            <a:r>
-              <a:rPr lang="de-DE" dirty="0" err="1"/>
-              <a:t>without</a:t>
-            </a:r>
-            <a:r>
-              <a:rPr lang="de-DE" dirty="0"/>
-              <a:t>     </a:t>
-            </a:r>
-            <a:r>
-              <a:rPr lang="de-DE" dirty="0" err="1"/>
-              <a:t>prior</a:t>
-            </a:r>
-            <a:r>
-              <a:rPr lang="de-DE" dirty="0"/>
-              <a:t> </a:t>
-            </a:r>
-            <a:r>
-              <a:rPr lang="de-DE" dirty="0" err="1"/>
-              <a:t>knowledge</a:t>
-            </a:r>
-            <a:r>
-              <a:rPr lang="de-DE" dirty="0"/>
-              <a:t> </a:t>
-            </a:r>
-            <a:r>
-              <a:rPr lang="de-DE" dirty="0" err="1"/>
-              <a:t>about</a:t>
-            </a:r>
-            <a:r>
-              <a:rPr lang="de-DE" dirty="0"/>
-              <a:t> </a:t>
-            </a:r>
-            <a:r>
-              <a:rPr lang="de-DE" dirty="0" err="1"/>
-              <a:t>the</a:t>
-            </a:r>
-            <a:r>
-              <a:rPr lang="de-DE" dirty="0"/>
-              <a:t> </a:t>
-            </a:r>
-            <a:r>
-              <a:rPr lang="de-DE" dirty="0" err="1"/>
-              <a:t>data</a:t>
-            </a:r>
-            <a:r>
-              <a:rPr lang="de-DE" dirty="0"/>
-              <a:t> [2],[3]</a:t>
-            </a:r>
-          </a:p>
-          <a:p>
-            <a:pPr>
-              <a:buFont typeface="Arial" panose="020B0604020202020204" pitchFamily="34" charset="0"/>
-              <a:buChar char="•"/>
-            </a:pPr>
-            <a:endParaRPr lang="de-DE" dirty="0"/>
-          </a:p>
-          <a:p>
-            <a:pPr indent="0"/>
-            <a:endParaRPr lang="de-DE" dirty="0"/>
-          </a:p>
-          <a:p>
-            <a:pPr>
-              <a:buFont typeface="Arial" panose="020B0604020202020204" pitchFamily="34" charset="0"/>
-              <a:buChar char="•"/>
-            </a:pPr>
-            <a:endParaRPr lang="de-DE" dirty="0"/>
-          </a:p>
-          <a:p>
-            <a:pPr>
-              <a:buFont typeface="Arial" panose="020B0604020202020204" pitchFamily="34" charset="0"/>
-              <a:buChar char="•"/>
-            </a:pPr>
-            <a:endParaRPr lang="de-DE" dirty="0"/>
-          </a:p>
-          <a:p>
-            <a:pPr indent="0"/>
-            <a:endParaRPr lang="de-DE" dirty="0"/>
-          </a:p>
-          <a:p>
-            <a:pPr>
-              <a:buFont typeface="Arial" panose="020B0604020202020204" pitchFamily="34" charset="0"/>
-              <a:buChar char="•"/>
-            </a:pPr>
-            <a:endParaRPr lang="de-DE" dirty="0"/>
-          </a:p>
-          <a:p>
-            <a:pPr>
-              <a:buFont typeface="Arial" panose="020B0604020202020204" pitchFamily="34" charset="0"/>
-              <a:buChar char="•"/>
-            </a:pPr>
-            <a:endParaRPr lang="de-DE" dirty="0"/>
-          </a:p>
-          <a:p>
-            <a:pPr>
-              <a:buFont typeface="Arial" panose="020B0604020202020204" pitchFamily="34" charset="0"/>
-              <a:buChar char="•"/>
-            </a:pPr>
-            <a:endParaRPr lang="de-DE" dirty="0"/>
-          </a:p>
-          <a:p>
-            <a:pPr>
-              <a:buFont typeface="Arial" panose="020B0604020202020204" pitchFamily="34" charset="0"/>
-              <a:buChar char="•"/>
-            </a:pPr>
-            <a:endParaRPr lang="de-DE" dirty="0"/>
-          </a:p>
-          <a:p>
-            <a:pPr>
-              <a:buFont typeface="Arial" panose="020B0604020202020204" pitchFamily="34" charset="0"/>
-              <a:buChar char="•"/>
-            </a:pPr>
-            <a:endParaRPr lang="de-DE" dirty="0"/>
-          </a:p>
-          <a:p>
-            <a:pPr>
-              <a:buFont typeface="Arial" panose="020B0604020202020204" pitchFamily="34" charset="0"/>
-              <a:buChar char="•"/>
-            </a:pPr>
-            <a:endParaRPr lang="de-DE" dirty="0"/>
-          </a:p>
-          <a:p>
-            <a:pPr>
-              <a:buFont typeface="Arial" panose="020B0604020202020204" pitchFamily="34" charset="0"/>
-              <a:buChar char="•"/>
-            </a:pPr>
-            <a:endParaRPr lang="de-DE" dirty="0"/>
-          </a:p>
-        </p:txBody>
-      </p:sp>
+      </p:pic>
       <p:sp>
         <p:nvSpPr>
           <p:cNvPr id="4" name="Foliennummernplatzhalter 3">
             <a:extLst>
               <a:ext uri="{FF2B5EF4-FFF2-40B4-BE49-F238E27FC236}">
-                <a16:creationId xmlns:a16="http://schemas.microsoft.com/office/drawing/2014/main" id="{B59A24B8-C35B-4F70-8D4D-FCB6F9A5905B}"/>
+                <a16:creationId xmlns:a16="http://schemas.microsoft.com/office/drawing/2014/main" id="{9C3788F9-86B1-4ADB-A593-D219AB9F87B5}"/>
               </a:ext>
             </a:extLst>
           </p:cNvPr>
@@ -3499,10 +3282,10 @@
       </p:sp>
       <p:sp>
         <p:nvSpPr>
-          <p:cNvPr id="6" name="Textfeld 5">
+          <p:cNvPr id="7" name="Textfeld 6">
             <a:extLst>
               <a:ext uri="{FF2B5EF4-FFF2-40B4-BE49-F238E27FC236}">
-                <a16:creationId xmlns:a16="http://schemas.microsoft.com/office/drawing/2014/main" id="{921CCF3A-0C67-402E-BC22-1C95BCD91F34}"/>
+                <a16:creationId xmlns:a16="http://schemas.microsoft.com/office/drawing/2014/main" id="{E184492F-6C40-4DBD-B7D7-52EE5EE3BC96}"/>
               </a:ext>
             </a:extLst>
           </p:cNvPr>
@@ -3511,8 +3294,8 @@
         </p:nvSpPr>
         <p:spPr>
           <a:xfrm>
-            <a:off x="1332000" y="5661248"/>
-            <a:ext cx="7183350" cy="1046440"/>
+            <a:off x="2843858" y="4933621"/>
+            <a:ext cx="3744416" cy="366792"/>
           </a:xfrm>
           <a:prstGeom prst="rect">
             <a:avLst/>
@@ -3526,173 +3309,16 @@
           <a:lstStyle/>
           <a:p>
             <a:r>
-              <a:rPr lang="de-DE" sz="1000" dirty="0"/>
-              <a:t>[1]</a:t>
-            </a:r>
-            <a:r>
-              <a:rPr lang="en-US" sz="1000" dirty="0"/>
-              <a:t> </a:t>
-            </a:r>
-            <a:r>
-              <a:rPr lang="en-US" sz="1000" dirty="0" err="1"/>
-              <a:t>Casiez</a:t>
-            </a:r>
-            <a:r>
-              <a:rPr lang="en-US" sz="1000" dirty="0"/>
-              <a:t>, G., Vogel, D., Balakrishnan, R., &amp; Cockburn, A. (2008). The impact of control-display gain on user performance in pointing tasks. Human–computer interaction, 23(3), 215-250.</a:t>
-            </a:r>
-          </a:p>
-          <a:p>
-            <a:r>
-              <a:rPr lang="en-US" sz="1000" dirty="0"/>
-              <a:t>[2] </a:t>
-            </a:r>
-            <a:r>
-              <a:rPr lang="de-DE" sz="1050" dirty="0" err="1"/>
-              <a:t>Mnih</a:t>
-            </a:r>
-            <a:r>
-              <a:rPr lang="de-DE" sz="1050" dirty="0"/>
-              <a:t>, V., </a:t>
-            </a:r>
-            <a:r>
-              <a:rPr lang="de-DE" sz="1050" dirty="0" err="1"/>
-              <a:t>Kavukcuoglu</a:t>
-            </a:r>
-            <a:r>
-              <a:rPr lang="de-DE" sz="1050" dirty="0"/>
-              <a:t>, K., </a:t>
-            </a:r>
-            <a:r>
-              <a:rPr lang="de-DE" sz="1050" dirty="0" err="1"/>
-              <a:t>Silver</a:t>
-            </a:r>
-            <a:r>
-              <a:rPr lang="de-DE" sz="1050" dirty="0"/>
-              <a:t>, D., Graves, A., </a:t>
-            </a:r>
-            <a:r>
-              <a:rPr lang="de-DE" sz="1050" dirty="0" err="1"/>
-              <a:t>Antonoglou</a:t>
-            </a:r>
-            <a:r>
-              <a:rPr lang="de-DE" sz="1050" dirty="0"/>
-              <a:t>, I., </a:t>
-            </a:r>
-            <a:r>
-              <a:rPr lang="de-DE" sz="1050" dirty="0" err="1"/>
-              <a:t>Wierstra</a:t>
-            </a:r>
-            <a:r>
-              <a:rPr lang="de-DE" sz="1050" dirty="0"/>
-              <a:t>, D., &amp; Riedmiller, M. (2013). </a:t>
-            </a:r>
-            <a:r>
-              <a:rPr lang="de-DE" sz="1050" dirty="0" err="1"/>
-              <a:t>Playing</a:t>
-            </a:r>
-            <a:r>
-              <a:rPr lang="de-DE" sz="1050" dirty="0"/>
-              <a:t> </a:t>
-            </a:r>
-            <a:r>
-              <a:rPr lang="de-DE" sz="1050" dirty="0" err="1"/>
-              <a:t>atari</a:t>
-            </a:r>
-            <a:r>
-              <a:rPr lang="de-DE" sz="1050" dirty="0"/>
-              <a:t> </a:t>
-            </a:r>
-            <a:r>
-              <a:rPr lang="de-DE" sz="1050" dirty="0" err="1"/>
-              <a:t>with</a:t>
-            </a:r>
-            <a:r>
-              <a:rPr lang="de-DE" sz="1050" dirty="0"/>
-              <a:t> </a:t>
-            </a:r>
-            <a:r>
-              <a:rPr lang="de-DE" sz="1050" dirty="0" err="1"/>
-              <a:t>deep</a:t>
-            </a:r>
-            <a:r>
-              <a:rPr lang="de-DE" sz="1050" dirty="0"/>
-              <a:t> </a:t>
-            </a:r>
-            <a:r>
-              <a:rPr lang="de-DE" sz="1050" dirty="0" err="1"/>
-              <a:t>reinforcement</a:t>
-            </a:r>
-            <a:r>
-              <a:rPr lang="de-DE" sz="1050" dirty="0"/>
-              <a:t> </a:t>
-            </a:r>
-            <a:r>
-              <a:rPr lang="de-DE" sz="1050" dirty="0" err="1"/>
-              <a:t>learning</a:t>
-            </a:r>
-            <a:r>
-              <a:rPr lang="de-DE" sz="1050" dirty="0"/>
-              <a:t>. </a:t>
-            </a:r>
-            <a:r>
-              <a:rPr lang="de-DE" sz="1050" dirty="0" err="1"/>
-              <a:t>arXiv</a:t>
-            </a:r>
-            <a:r>
-              <a:rPr lang="de-DE" sz="1050" dirty="0"/>
-              <a:t> </a:t>
-            </a:r>
-            <a:r>
-              <a:rPr lang="de-DE" sz="1050" dirty="0" err="1"/>
-              <a:t>preprint</a:t>
-            </a:r>
-            <a:r>
-              <a:rPr lang="de-DE" sz="1050" dirty="0"/>
-              <a:t> arXiv:1312.5602.</a:t>
-            </a:r>
-          </a:p>
-          <a:p>
-            <a:r>
-              <a:rPr lang="de-DE" sz="1050" dirty="0"/>
-              <a:t>[3] </a:t>
-            </a:r>
-            <a:r>
-              <a:rPr lang="en-US" sz="1050" dirty="0"/>
-              <a:t>Silver, D., Huang, A., Maddison, C. J., </a:t>
-            </a:r>
-            <a:r>
-              <a:rPr lang="en-US" sz="1050" dirty="0" err="1"/>
-              <a:t>Guez</a:t>
-            </a:r>
-            <a:r>
-              <a:rPr lang="en-US" sz="1050" dirty="0"/>
-              <a:t>, A., </a:t>
-            </a:r>
-            <a:r>
-              <a:rPr lang="en-US" sz="1050" dirty="0" err="1"/>
-              <a:t>Sifre</a:t>
-            </a:r>
-            <a:r>
-              <a:rPr lang="en-US" sz="1050" dirty="0"/>
-              <a:t>, L., Van Den </a:t>
-            </a:r>
-            <a:r>
-              <a:rPr lang="en-US" sz="1050" dirty="0" err="1"/>
-              <a:t>Driessche</a:t>
-            </a:r>
-            <a:r>
-              <a:rPr lang="en-US" sz="1050" dirty="0"/>
-              <a:t>, G., ... &amp; Dieleman, S. (2016). Mastering the game of Go with deep neural networks and tree search. nature, 529(7587), 484.</a:t>
-            </a:r>
-            <a:endParaRPr lang="de-DE" sz="1000" dirty="0"/>
+              <a:rPr lang="de-DE" dirty="0"/>
+              <a:t>Image source: https://optitrack.com/</a:t>
+            </a:r>
           </a:p>
         </p:txBody>
       </p:sp>
     </p:spTree>
     <p:extLst>
       <p:ext uri="{BB962C8B-B14F-4D97-AF65-F5344CB8AC3E}">
-        <p14:creationId xmlns:p14="http://schemas.microsoft.com/office/powerpoint/2010/main" val="2604477137"/>
+        <p14:creationId xmlns:p14="http://schemas.microsoft.com/office/powerpoint/2010/main" val="4026131423"/>
       </p:ext>
     </p:extLst>
   </p:cSld>
@@ -3724,7 +3350,7 @@
           <p:cNvPr id="2" name="Titel 1">
             <a:extLst>
               <a:ext uri="{FF2B5EF4-FFF2-40B4-BE49-F238E27FC236}">
-                <a16:creationId xmlns:a16="http://schemas.microsoft.com/office/drawing/2014/main" id="{B52233C8-DAD8-443D-BB27-A05E98F2CA20}"/>
+                <a16:creationId xmlns:a16="http://schemas.microsoft.com/office/drawing/2014/main" id="{43696BFB-F0F4-4C20-BE5F-0DE2A8CA8620}"/>
               </a:ext>
             </a:extLst>
           </p:cNvPr>
@@ -3741,12 +3367,8 @@
           <a:lstStyle/>
           <a:p>
             <a:r>
-              <a:rPr lang="de-DE" dirty="0"/>
-              <a:t>Research </a:t>
-            </a:r>
-            <a:r>
-              <a:rPr lang="de-DE" dirty="0" err="1"/>
-              <a:t>question</a:t>
+              <a:rPr lang="de-DE" dirty="0" err="1"/>
+              <a:t>Enviroment</a:t>
             </a:r>
             <a:endParaRPr lang="de-DE" dirty="0"/>
           </a:p>
@@ -3757,7 +3379,7 @@
           <p:cNvPr id="4" name="Foliennummernplatzhalter 3">
             <a:extLst>
               <a:ext uri="{FF2B5EF4-FFF2-40B4-BE49-F238E27FC236}">
-                <a16:creationId xmlns:a16="http://schemas.microsoft.com/office/drawing/2014/main" id="{B59A24B8-C35B-4F70-8D4D-FCB6F9A5905B}"/>
+                <a16:creationId xmlns:a16="http://schemas.microsoft.com/office/drawing/2014/main" id="{9C3788F9-86B1-4ADB-A593-D219AB9F87B5}"/>
               </a:ext>
             </a:extLst>
           </p:cNvPr>
@@ -3781,12 +3403,383 @@
           </a:p>
         </p:txBody>
       </p:sp>
-      <p:sp>
-        <p:nvSpPr>
-          <p:cNvPr id="11" name="Rechteck: abgerundete Ecken 10">
+      <p:pic>
+        <p:nvPicPr>
+          <p:cNvPr id="11" name="Grafik 10" descr="Ein Bild, das dunkel, erleuchtet, drinnen enthält.&#10;&#10;Automatisch generierte Beschreibung">
             <a:extLst>
               <a:ext uri="{FF2B5EF4-FFF2-40B4-BE49-F238E27FC236}">
-                <a16:creationId xmlns:a16="http://schemas.microsoft.com/office/drawing/2014/main" id="{417B5DA9-3F5C-4F92-ADC6-0A7AB976E321}"/>
+                <a16:creationId xmlns:a16="http://schemas.microsoft.com/office/drawing/2014/main" id="{F4E6532C-DFCA-44F7-85B8-5A6B9AB12884}"/>
+              </a:ext>
+            </a:extLst>
+          </p:cNvPr>
+          <p:cNvPicPr>
+            <a:picLocks noChangeAspect="1"/>
+          </p:cNvPicPr>
+          <p:nvPr/>
+        </p:nvPicPr>
+        <p:blipFill>
+          <a:blip r:embed="rId2">
+            <a:extLst>
+              <a:ext uri="{28A0092B-C50C-407E-A947-70E740481C1C}">
+                <a14:useLocalDpi xmlns:a14="http://schemas.microsoft.com/office/drawing/2010/main" val="0"/>
+              </a:ext>
+            </a:extLst>
+          </a:blip>
+          <a:stretch>
+            <a:fillRect/>
+          </a:stretch>
+        </p:blipFill>
+        <p:spPr>
+          <a:xfrm>
+            <a:off x="755576" y="2780928"/>
+            <a:ext cx="2381250" cy="866775"/>
+          </a:xfrm>
+          <a:prstGeom prst="rect">
+            <a:avLst/>
+          </a:prstGeom>
+        </p:spPr>
+      </p:pic>
+      <p:pic>
+        <p:nvPicPr>
+          <p:cNvPr id="13" name="Grafik 12">
+            <a:extLst>
+              <a:ext uri="{FF2B5EF4-FFF2-40B4-BE49-F238E27FC236}">
+                <a16:creationId xmlns:a16="http://schemas.microsoft.com/office/drawing/2014/main" id="{6B7C9EF0-81E2-45E7-876B-A8B62A035BBB}"/>
+              </a:ext>
+            </a:extLst>
+          </p:cNvPr>
+          <p:cNvPicPr>
+            <a:picLocks noChangeAspect="1"/>
+          </p:cNvPicPr>
+          <p:nvPr/>
+        </p:nvPicPr>
+        <p:blipFill>
+          <a:blip r:embed="rId3">
+            <a:extLst>
+              <a:ext uri="{28A0092B-C50C-407E-A947-70E740481C1C}">
+                <a14:useLocalDpi xmlns:a14="http://schemas.microsoft.com/office/drawing/2010/main" val="0"/>
+              </a:ext>
+            </a:extLst>
+          </a:blip>
+          <a:stretch>
+            <a:fillRect/>
+          </a:stretch>
+        </p:blipFill>
+        <p:spPr>
+          <a:xfrm>
+            <a:off x="4427984" y="2357065"/>
+            <a:ext cx="3667125" cy="1714500"/>
+          </a:xfrm>
+          <a:prstGeom prst="rect">
+            <a:avLst/>
+          </a:prstGeom>
+        </p:spPr>
+      </p:pic>
+      <p:pic>
+        <p:nvPicPr>
+          <p:cNvPr id="15" name="Grafik 14">
+            <a:extLst>
+              <a:ext uri="{FF2B5EF4-FFF2-40B4-BE49-F238E27FC236}">
+                <a16:creationId xmlns:a16="http://schemas.microsoft.com/office/drawing/2014/main" id="{6B676917-931B-4401-B92D-585E96AADC7C}"/>
+              </a:ext>
+            </a:extLst>
+          </p:cNvPr>
+          <p:cNvPicPr>
+            <a:picLocks noChangeAspect="1"/>
+          </p:cNvPicPr>
+          <p:nvPr/>
+        </p:nvPicPr>
+        <p:blipFill>
+          <a:blip r:embed="rId4" cstate="print">
+            <a:extLst>
+              <a:ext uri="{28A0092B-C50C-407E-A947-70E740481C1C}">
+                <a14:useLocalDpi xmlns:a14="http://schemas.microsoft.com/office/drawing/2010/main" val="0"/>
+              </a:ext>
+            </a:extLst>
+          </a:blip>
+          <a:stretch>
+            <a:fillRect/>
+          </a:stretch>
+        </p:blipFill>
+        <p:spPr>
+          <a:xfrm>
+            <a:off x="1332000" y="4118757"/>
+            <a:ext cx="1554145" cy="1662158"/>
+          </a:xfrm>
+          <a:prstGeom prst="rect">
+            <a:avLst/>
+          </a:prstGeom>
+        </p:spPr>
+      </p:pic>
+      <p:pic>
+        <p:nvPicPr>
+          <p:cNvPr id="17" name="Grafik 16">
+            <a:extLst>
+              <a:ext uri="{FF2B5EF4-FFF2-40B4-BE49-F238E27FC236}">
+                <a16:creationId xmlns:a16="http://schemas.microsoft.com/office/drawing/2014/main" id="{AA62F4A7-4646-4C9C-8E20-3B3A50135E32}"/>
+              </a:ext>
+            </a:extLst>
+          </p:cNvPr>
+          <p:cNvPicPr>
+            <a:picLocks noChangeAspect="1"/>
+          </p:cNvPicPr>
+          <p:nvPr/>
+        </p:nvPicPr>
+        <p:blipFill>
+          <a:blip r:embed="rId5">
+            <a:extLst>
+              <a:ext uri="{28A0092B-C50C-407E-A947-70E740481C1C}">
+                <a14:useLocalDpi xmlns:a14="http://schemas.microsoft.com/office/drawing/2010/main" val="0"/>
+              </a:ext>
+            </a:extLst>
+          </a:blip>
+          <a:stretch>
+            <a:fillRect/>
+          </a:stretch>
+        </p:blipFill>
+        <p:spPr>
+          <a:xfrm>
+            <a:off x="5350004" y="4230518"/>
+            <a:ext cx="1823083" cy="1823083"/>
+          </a:xfrm>
+          <a:prstGeom prst="rect">
+            <a:avLst/>
+          </a:prstGeom>
+        </p:spPr>
+      </p:pic>
+      <p:sp>
+        <p:nvSpPr>
+          <p:cNvPr id="18" name="Textfeld 17">
+            <a:extLst>
+              <a:ext uri="{FF2B5EF4-FFF2-40B4-BE49-F238E27FC236}">
+                <a16:creationId xmlns:a16="http://schemas.microsoft.com/office/drawing/2014/main" id="{8CEDA7C9-392B-425E-9884-E3FF60EE3575}"/>
+              </a:ext>
+            </a:extLst>
+          </p:cNvPr>
+          <p:cNvSpPr txBox="1"/>
+          <p:nvPr/>
+        </p:nvSpPr>
+        <p:spPr>
+          <a:xfrm>
+            <a:off x="4981786" y="3647703"/>
+            <a:ext cx="2952328" cy="261610"/>
+          </a:xfrm>
+          <a:prstGeom prst="rect">
+            <a:avLst/>
+          </a:prstGeom>
+          <a:noFill/>
+        </p:spPr>
+        <p:txBody>
+          <a:bodyPr wrap="square" rtlCol="0">
+            <a:spAutoFit/>
+          </a:bodyPr>
+          <a:lstStyle/>
+          <a:p>
+            <a:r>
+              <a:rPr lang="de-DE" sz="1100" dirty="0"/>
+              <a:t>Image source: https://optitrack.com/</a:t>
+            </a:r>
+          </a:p>
+        </p:txBody>
+      </p:sp>
+      <p:sp>
+        <p:nvSpPr>
+          <p:cNvPr id="19" name="Textfeld 18">
+            <a:extLst>
+              <a:ext uri="{FF2B5EF4-FFF2-40B4-BE49-F238E27FC236}">
+                <a16:creationId xmlns:a16="http://schemas.microsoft.com/office/drawing/2014/main" id="{F917AA0F-80F5-4680-A802-A2A0F255DD93}"/>
+              </a:ext>
+            </a:extLst>
+          </p:cNvPr>
+          <p:cNvSpPr txBox="1"/>
+          <p:nvPr/>
+        </p:nvSpPr>
+        <p:spPr>
+          <a:xfrm>
+            <a:off x="4981786" y="5791991"/>
+            <a:ext cx="2952328" cy="261610"/>
+          </a:xfrm>
+          <a:prstGeom prst="rect">
+            <a:avLst/>
+          </a:prstGeom>
+          <a:noFill/>
+        </p:spPr>
+        <p:txBody>
+          <a:bodyPr wrap="square" rtlCol="0">
+            <a:spAutoFit/>
+          </a:bodyPr>
+          <a:lstStyle/>
+          <a:p>
+            <a:r>
+              <a:rPr lang="de-DE" sz="1100" dirty="0"/>
+              <a:t>Image source: https://python.org/</a:t>
+            </a:r>
+          </a:p>
+        </p:txBody>
+      </p:sp>
+      <p:sp>
+        <p:nvSpPr>
+          <p:cNvPr id="20" name="Textfeld 19">
+            <a:extLst>
+              <a:ext uri="{FF2B5EF4-FFF2-40B4-BE49-F238E27FC236}">
+                <a16:creationId xmlns:a16="http://schemas.microsoft.com/office/drawing/2014/main" id="{39E2DBE4-1740-4EB1-95E9-7959A24B1BA9}"/>
+              </a:ext>
+            </a:extLst>
+          </p:cNvPr>
+          <p:cNvSpPr txBox="1"/>
+          <p:nvPr/>
+        </p:nvSpPr>
+        <p:spPr>
+          <a:xfrm>
+            <a:off x="777863" y="5780915"/>
+            <a:ext cx="2952328" cy="261610"/>
+          </a:xfrm>
+          <a:prstGeom prst="rect">
+            <a:avLst/>
+          </a:prstGeom>
+          <a:noFill/>
+        </p:spPr>
+        <p:txBody>
+          <a:bodyPr wrap="square" rtlCol="0">
+            <a:spAutoFit/>
+          </a:bodyPr>
+          <a:lstStyle/>
+          <a:p>
+            <a:r>
+              <a:rPr lang="de-DE" sz="1100" dirty="0"/>
+              <a:t>Image source: https://tensorflow.org/</a:t>
+            </a:r>
+          </a:p>
+        </p:txBody>
+      </p:sp>
+      <p:sp>
+        <p:nvSpPr>
+          <p:cNvPr id="21" name="Textfeld 20">
+            <a:extLst>
+              <a:ext uri="{FF2B5EF4-FFF2-40B4-BE49-F238E27FC236}">
+                <a16:creationId xmlns:a16="http://schemas.microsoft.com/office/drawing/2014/main" id="{0BBCDBD3-46CB-4ADF-9A72-461A9E4BCC8E}"/>
+              </a:ext>
+            </a:extLst>
+          </p:cNvPr>
+          <p:cNvSpPr txBox="1"/>
+          <p:nvPr/>
+        </p:nvSpPr>
+        <p:spPr>
+          <a:xfrm>
+            <a:off x="1048891" y="3647146"/>
+            <a:ext cx="2952328" cy="261610"/>
+          </a:xfrm>
+          <a:prstGeom prst="rect">
+            <a:avLst/>
+          </a:prstGeom>
+          <a:noFill/>
+        </p:spPr>
+        <p:txBody>
+          <a:bodyPr wrap="square" rtlCol="0">
+            <a:spAutoFit/>
+          </a:bodyPr>
+          <a:lstStyle/>
+          <a:p>
+            <a:r>
+              <a:rPr lang="de-DE" sz="1100" dirty="0"/>
+              <a:t>Image source: https://unity.com/</a:t>
+            </a:r>
+          </a:p>
+        </p:txBody>
+      </p:sp>
+    </p:spTree>
+    <p:extLst>
+      <p:ext uri="{BB962C8B-B14F-4D97-AF65-F5344CB8AC3E}">
+        <p14:creationId xmlns:p14="http://schemas.microsoft.com/office/powerpoint/2010/main" val="1419530721"/>
+      </p:ext>
+    </p:extLst>
+  </p:cSld>
+  <p:clrMapOvr>
+    <a:masterClrMapping/>
+  </p:clrMapOvr>
+</p:sld>
+</file>
+
+<file path=ppt/slides/slide5.xml><?xml version="1.0" encoding="utf-8"?>
+<p:sld xmlns:a="http://schemas.openxmlformats.org/drawingml/2006/main" xmlns:r="http://schemas.openxmlformats.org/officeDocument/2006/relationships" xmlns:p="http://schemas.openxmlformats.org/presentationml/2006/main">
+  <p:cSld>
+    <p:spTree>
+      <p:nvGrpSpPr>
+        <p:cNvPr id="1" name=""/>
+        <p:cNvGrpSpPr/>
+        <p:nvPr/>
+      </p:nvGrpSpPr>
+      <p:grpSpPr>
+        <a:xfrm>
+          <a:off x="0" y="0"/>
+          <a:ext cx="0" cy="0"/>
+          <a:chOff x="0" y="0"/>
+          <a:chExt cx="0" cy="0"/>
+        </a:xfrm>
+      </p:grpSpPr>
+      <p:sp>
+        <p:nvSpPr>
+          <p:cNvPr id="2" name="Titel 1">
+            <a:extLst>
+              <a:ext uri="{FF2B5EF4-FFF2-40B4-BE49-F238E27FC236}">
+                <a16:creationId xmlns:a16="http://schemas.microsoft.com/office/drawing/2014/main" id="{8E381FA6-0159-4861-A79C-B63FE09BFA48}"/>
+              </a:ext>
+            </a:extLst>
+          </p:cNvPr>
+          <p:cNvSpPr>
+            <a:spLocks noGrp="1"/>
+          </p:cNvSpPr>
+          <p:nvPr>
+            <p:ph type="title"/>
+          </p:nvPr>
+        </p:nvSpPr>
+        <p:spPr/>
+        <p:txBody>
+          <a:bodyPr/>
+          <a:lstStyle/>
+          <a:p>
+            <a:r>
+              <a:rPr lang="de-DE" dirty="0"/>
+              <a:t>Problem Statement</a:t>
+            </a:r>
+          </a:p>
+        </p:txBody>
+      </p:sp>
+      <p:sp>
+        <p:nvSpPr>
+          <p:cNvPr id="4" name="Foliennummernplatzhalter 3">
+            <a:extLst>
+              <a:ext uri="{FF2B5EF4-FFF2-40B4-BE49-F238E27FC236}">
+                <a16:creationId xmlns:a16="http://schemas.microsoft.com/office/drawing/2014/main" id="{F0C81246-6E36-4978-B38A-7DF811FD3D3B}"/>
+              </a:ext>
+            </a:extLst>
+          </p:cNvPr>
+          <p:cNvSpPr>
+            <a:spLocks noGrp="1"/>
+          </p:cNvSpPr>
+          <p:nvPr>
+            <p:ph type="sldNum" sz="quarter" idx="10"/>
+          </p:nvPr>
+        </p:nvSpPr>
+        <p:spPr/>
+        <p:txBody>
+          <a:bodyPr/>
+          <a:lstStyle/>
+          <a:p>
+            <a:fld id="{9BBAE405-9238-4745-AB75-58013C9D9462}" type="slidenum">
+              <a:rPr lang="de-DE" smtClean="0"/>
+              <a:t>5</a:t>
+            </a:fld>
+            <a:endParaRPr lang="de-DE" dirty="0"/>
+          </a:p>
+        </p:txBody>
+      </p:sp>
+      <p:sp>
+        <p:nvSpPr>
+          <p:cNvPr id="5" name="Rechteck: abgerundete Ecken 4">
+            <a:extLst>
+              <a:ext uri="{FF2B5EF4-FFF2-40B4-BE49-F238E27FC236}">
+                <a16:creationId xmlns:a16="http://schemas.microsoft.com/office/drawing/2014/main" id="{DA13A843-B128-4749-A97D-CA6EEC307DA0}"/>
               </a:ext>
             </a:extLst>
           </p:cNvPr>
@@ -3795,8 +3788,8 @@
         </p:nvSpPr>
         <p:spPr>
           <a:xfrm>
-            <a:off x="2709139" y="2420888"/>
-            <a:ext cx="792088" cy="438800"/>
+            <a:off x="467544" y="2564904"/>
+            <a:ext cx="1800200" cy="504056"/>
           </a:xfrm>
           <a:prstGeom prst="roundRect">
             <a:avLst/>
@@ -3824,18 +3817,19 @@
           <a:p>
             <a:pPr algn="ctr"/>
             <a:r>
-              <a:rPr lang="de-DE" dirty="0"/>
-              <a:t>Input</a:t>
-            </a:r>
+              <a:rPr lang="de-DE" dirty="0" err="1"/>
+              <a:t>OptiTrack</a:t>
+            </a:r>
+            <a:endParaRPr lang="de-DE" dirty="0"/>
           </a:p>
         </p:txBody>
       </p:sp>
       <p:sp>
         <p:nvSpPr>
-          <p:cNvPr id="12" name="Rechteck: abgerundete Ecken 11">
+          <p:cNvPr id="6" name="Rechteck: abgerundete Ecken 5">
             <a:extLst>
               <a:ext uri="{FF2B5EF4-FFF2-40B4-BE49-F238E27FC236}">
-                <a16:creationId xmlns:a16="http://schemas.microsoft.com/office/drawing/2014/main" id="{838F74FD-BE07-4AD8-A989-25BCF9F9AB78}"/>
+                <a16:creationId xmlns:a16="http://schemas.microsoft.com/office/drawing/2014/main" id="{FD03C16C-7E18-458F-9615-9EAD70D48F7F}"/>
               </a:ext>
             </a:extLst>
           </p:cNvPr>
@@ -3844,8 +3838,57 @@
         </p:nvSpPr>
         <p:spPr>
           <a:xfrm>
-            <a:off x="4139952" y="2420888"/>
-            <a:ext cx="792088" cy="438800"/>
+            <a:off x="3059832" y="2564904"/>
+            <a:ext cx="1800200" cy="504056"/>
+          </a:xfrm>
+          <a:prstGeom prst="roundRect">
+            <a:avLst/>
+          </a:prstGeom>
+        </p:spPr>
+        <p:style>
+          <a:lnRef idx="2">
+            <a:schemeClr val="accent2">
+              <a:shade val="50000"/>
+            </a:schemeClr>
+          </a:lnRef>
+          <a:fillRef idx="1">
+            <a:schemeClr val="accent2"/>
+          </a:fillRef>
+          <a:effectRef idx="0">
+            <a:schemeClr val="accent2"/>
+          </a:effectRef>
+          <a:fontRef idx="minor">
+            <a:schemeClr val="lt1"/>
+          </a:fontRef>
+        </p:style>
+        <p:txBody>
+          <a:bodyPr rtlCol="0" anchor="ctr"/>
+          <a:lstStyle/>
+          <a:p>
+            <a:pPr algn="ctr"/>
+            <a:r>
+              <a:rPr lang="de-DE" dirty="0"/>
+              <a:t>Python-Interface</a:t>
+            </a:r>
+          </a:p>
+        </p:txBody>
+      </p:sp>
+      <p:sp>
+        <p:nvSpPr>
+          <p:cNvPr id="7" name="Rechteck: abgerundete Ecken 6">
+            <a:extLst>
+              <a:ext uri="{FF2B5EF4-FFF2-40B4-BE49-F238E27FC236}">
+                <a16:creationId xmlns:a16="http://schemas.microsoft.com/office/drawing/2014/main" id="{F387EDA6-5A8E-4B1E-B98B-BD562FC7329A}"/>
+              </a:ext>
+            </a:extLst>
+          </p:cNvPr>
+          <p:cNvSpPr/>
+          <p:nvPr/>
+        </p:nvSpPr>
+        <p:spPr>
+          <a:xfrm>
+            <a:off x="5652120" y="2564904"/>
+            <a:ext cx="1800200" cy="504056"/>
           </a:xfrm>
           <a:prstGeom prst="roundRect">
             <a:avLst/>
@@ -3874,17 +3917,17 @@
             <a:pPr algn="ctr"/>
             <a:r>
               <a:rPr lang="de-DE" dirty="0"/>
-              <a:t>TF</a:t>
+              <a:t>Unity</a:t>
             </a:r>
           </a:p>
         </p:txBody>
       </p:sp>
       <p:sp>
         <p:nvSpPr>
-          <p:cNvPr id="13" name="Rechteck: abgerundete Ecken 12">
+          <p:cNvPr id="8" name="Rechteck: abgerundete Ecken 7">
             <a:extLst>
               <a:ext uri="{FF2B5EF4-FFF2-40B4-BE49-F238E27FC236}">
-                <a16:creationId xmlns:a16="http://schemas.microsoft.com/office/drawing/2014/main" id="{5E513ADE-8111-4E8D-A143-50041FD1823A}"/>
+                <a16:creationId xmlns:a16="http://schemas.microsoft.com/office/drawing/2014/main" id="{7146409A-703F-4FC3-9813-444D170B8F03}"/>
               </a:ext>
             </a:extLst>
           </p:cNvPr>
@@ -3893,224 +3936,8 @@
         </p:nvSpPr>
         <p:spPr>
           <a:xfrm>
-            <a:off x="5570765" y="2420888"/>
-            <a:ext cx="792088" cy="438800"/>
-          </a:xfrm>
-          <a:prstGeom prst="roundRect">
-            <a:avLst/>
-          </a:prstGeom>
-        </p:spPr>
-        <p:style>
-          <a:lnRef idx="2">
-            <a:schemeClr val="accent1">
-              <a:shade val="50000"/>
-            </a:schemeClr>
-          </a:lnRef>
-          <a:fillRef idx="1">
-            <a:schemeClr val="accent1"/>
-          </a:fillRef>
-          <a:effectRef idx="0">
-            <a:schemeClr val="accent1"/>
-          </a:effectRef>
-          <a:fontRef idx="minor">
-            <a:schemeClr val="lt1"/>
-          </a:fontRef>
-        </p:style>
-        <p:txBody>
-          <a:bodyPr rtlCol="0" anchor="ctr"/>
-          <a:lstStyle/>
-          <a:p>
-            <a:pPr algn="ctr"/>
-            <a:r>
-              <a:rPr lang="de-DE" sz="1400" dirty="0"/>
-              <a:t>Output</a:t>
-            </a:r>
-          </a:p>
-        </p:txBody>
-      </p:sp>
-      <p:cxnSp>
-        <p:nvCxnSpPr>
-          <p:cNvPr id="14" name="Gerade Verbindung mit Pfeil 13">
-            <a:extLst>
-              <a:ext uri="{FF2B5EF4-FFF2-40B4-BE49-F238E27FC236}">
-                <a16:creationId xmlns:a16="http://schemas.microsoft.com/office/drawing/2014/main" id="{4B9843CA-D692-4B8E-890D-81624819A769}"/>
-              </a:ext>
-            </a:extLst>
-          </p:cNvPr>
-          <p:cNvCxnSpPr>
-            <a:cxnSpLocks/>
-            <a:stCxn id="11" idx="3"/>
-            <a:endCxn id="12" idx="1"/>
-          </p:cNvCxnSpPr>
-          <p:nvPr/>
-        </p:nvCxnSpPr>
-        <p:spPr>
-          <a:xfrm>
-            <a:off x="3501227" y="2640288"/>
-            <a:ext cx="638725" cy="0"/>
-          </a:xfrm>
-          <a:prstGeom prst="straightConnector1">
-            <a:avLst/>
-          </a:prstGeom>
-          <a:ln>
-            <a:tailEnd type="triangle"/>
-          </a:ln>
-        </p:spPr>
-        <p:style>
-          <a:lnRef idx="2">
-            <a:schemeClr val="accent1"/>
-          </a:lnRef>
-          <a:fillRef idx="0">
-            <a:schemeClr val="accent1"/>
-          </a:fillRef>
-          <a:effectRef idx="1">
-            <a:schemeClr val="accent1"/>
-          </a:effectRef>
-          <a:fontRef idx="minor">
-            <a:schemeClr val="tx1"/>
-          </a:fontRef>
-        </p:style>
-      </p:cxnSp>
-      <p:cxnSp>
-        <p:nvCxnSpPr>
-          <p:cNvPr id="15" name="Gerade Verbindung mit Pfeil 14">
-            <a:extLst>
-              <a:ext uri="{FF2B5EF4-FFF2-40B4-BE49-F238E27FC236}">
-                <a16:creationId xmlns:a16="http://schemas.microsoft.com/office/drawing/2014/main" id="{B1B9FD12-09DC-4592-965E-6F23DCD7D60A}"/>
-              </a:ext>
-            </a:extLst>
-          </p:cNvPr>
-          <p:cNvCxnSpPr>
-            <a:cxnSpLocks/>
-            <a:stCxn id="12" idx="3"/>
-          </p:cNvCxnSpPr>
-          <p:nvPr/>
-        </p:nvCxnSpPr>
-        <p:spPr>
-          <a:xfrm>
-            <a:off x="4932040" y="2640288"/>
-            <a:ext cx="638725" cy="0"/>
-          </a:xfrm>
-          <a:prstGeom prst="straightConnector1">
-            <a:avLst/>
-          </a:prstGeom>
-          <a:ln>
-            <a:tailEnd type="triangle"/>
-          </a:ln>
-        </p:spPr>
-        <p:style>
-          <a:lnRef idx="2">
-            <a:schemeClr val="accent1"/>
-          </a:lnRef>
-          <a:fillRef idx="0">
-            <a:schemeClr val="accent1"/>
-          </a:fillRef>
-          <a:effectRef idx="1">
-            <a:schemeClr val="accent1"/>
-          </a:effectRef>
-          <a:fontRef idx="minor">
-            <a:schemeClr val="tx1"/>
-          </a:fontRef>
-        </p:style>
-      </p:cxnSp>
-      <p:cxnSp>
-        <p:nvCxnSpPr>
-          <p:cNvPr id="16" name="Gerade Verbindung mit Pfeil 15">
-            <a:extLst>
-              <a:ext uri="{FF2B5EF4-FFF2-40B4-BE49-F238E27FC236}">
-                <a16:creationId xmlns:a16="http://schemas.microsoft.com/office/drawing/2014/main" id="{7549C4FC-CA84-448B-8474-678815EE07E7}"/>
-              </a:ext>
-            </a:extLst>
-          </p:cNvPr>
-          <p:cNvCxnSpPr>
-            <a:cxnSpLocks/>
-          </p:cNvCxnSpPr>
-          <p:nvPr/>
-        </p:nvCxnSpPr>
-        <p:spPr>
-          <a:xfrm>
-            <a:off x="4427984" y="2859688"/>
-            <a:ext cx="0" cy="785336"/>
-          </a:xfrm>
-          <a:prstGeom prst="straightConnector1">
-            <a:avLst/>
-          </a:prstGeom>
-          <a:ln>
-            <a:tailEnd type="triangle"/>
-          </a:ln>
-        </p:spPr>
-        <p:style>
-          <a:lnRef idx="2">
-            <a:schemeClr val="accent1"/>
-          </a:lnRef>
-          <a:fillRef idx="0">
-            <a:schemeClr val="accent1"/>
-          </a:fillRef>
-          <a:effectRef idx="1">
-            <a:schemeClr val="accent1"/>
-          </a:effectRef>
-          <a:fontRef idx="minor">
-            <a:schemeClr val="tx1"/>
-          </a:fontRef>
-        </p:style>
-      </p:cxnSp>
-      <p:cxnSp>
-        <p:nvCxnSpPr>
-          <p:cNvPr id="18" name="Gerade Verbindung mit Pfeil 17">
-            <a:extLst>
-              <a:ext uri="{FF2B5EF4-FFF2-40B4-BE49-F238E27FC236}">
-                <a16:creationId xmlns:a16="http://schemas.microsoft.com/office/drawing/2014/main" id="{4C75FB38-6233-4D2B-9B36-C66FF3CF061B}"/>
-              </a:ext>
-            </a:extLst>
-          </p:cNvPr>
-          <p:cNvCxnSpPr>
-            <a:cxnSpLocks/>
-          </p:cNvCxnSpPr>
-          <p:nvPr/>
-        </p:nvCxnSpPr>
-        <p:spPr>
-          <a:xfrm flipV="1">
-            <a:off x="4644008" y="2852936"/>
-            <a:ext cx="0" cy="792088"/>
-          </a:xfrm>
-          <a:prstGeom prst="straightConnector1">
-            <a:avLst/>
-          </a:prstGeom>
-          <a:ln>
-            <a:tailEnd type="triangle"/>
-          </a:ln>
-        </p:spPr>
-        <p:style>
-          <a:lnRef idx="2">
-            <a:schemeClr val="accent2"/>
-          </a:lnRef>
-          <a:fillRef idx="0">
-            <a:schemeClr val="accent2"/>
-          </a:fillRef>
-          <a:effectRef idx="1">
-            <a:schemeClr val="accent2"/>
-          </a:effectRef>
-          <a:fontRef idx="minor">
-            <a:schemeClr val="tx1"/>
-          </a:fontRef>
-        </p:style>
-      </p:cxnSp>
-      <p:sp>
-        <p:nvSpPr>
-          <p:cNvPr id="23" name="Rechteck: abgerundete Ecken 22">
-            <a:extLst>
-              <a:ext uri="{FF2B5EF4-FFF2-40B4-BE49-F238E27FC236}">
-                <a16:creationId xmlns:a16="http://schemas.microsoft.com/office/drawing/2014/main" id="{475141F2-2661-4BC2-BD83-EAF3443DD9E5}"/>
-              </a:ext>
-            </a:extLst>
-          </p:cNvPr>
-          <p:cNvSpPr/>
-          <p:nvPr/>
-        </p:nvSpPr>
-        <p:spPr>
-          <a:xfrm>
-            <a:off x="4139952" y="3645024"/>
-            <a:ext cx="792088" cy="438800"/>
+            <a:off x="3059832" y="3575424"/>
+            <a:ext cx="1800200" cy="504056"/>
           </a:xfrm>
           <a:prstGeom prst="roundRect">
             <a:avLst/>
@@ -4138,129 +3965,76 @@
           <a:p>
             <a:pPr algn="ctr"/>
             <a:r>
-              <a:rPr lang="de-DE" dirty="0"/>
-              <a:t>DRL</a:t>
-            </a:r>
+              <a:rPr lang="de-DE" dirty="0" err="1"/>
+              <a:t>Prediction</a:t>
+            </a:r>
+            <a:endParaRPr lang="de-DE" dirty="0"/>
           </a:p>
         </p:txBody>
       </p:sp>
-      <p:sp>
-        <p:nvSpPr>
-          <p:cNvPr id="25" name="Rechteck: abgerundete Ecken 24">
+      <p:cxnSp>
+        <p:nvCxnSpPr>
+          <p:cNvPr id="12" name="Verbinder: gewinkelt 11">
             <a:extLst>
               <a:ext uri="{FF2B5EF4-FFF2-40B4-BE49-F238E27FC236}">
-                <a16:creationId xmlns:a16="http://schemas.microsoft.com/office/drawing/2014/main" id="{BC3BD950-945E-4494-A5AC-51F986E8B875}"/>
-              </a:ext>
-            </a:extLst>
-          </p:cNvPr>
-          <p:cNvSpPr/>
-          <p:nvPr/>
-        </p:nvSpPr>
-        <p:spPr>
-          <a:xfrm>
-            <a:off x="5415622" y="3142655"/>
-            <a:ext cx="1102373" cy="438800"/>
-          </a:xfrm>
-          <a:prstGeom prst="roundRect">
-            <a:avLst/>
-          </a:prstGeom>
-        </p:spPr>
-        <p:style>
-          <a:lnRef idx="2">
-            <a:schemeClr val="accent3">
-              <a:shade val="50000"/>
-            </a:schemeClr>
-          </a:lnRef>
-          <a:fillRef idx="1">
-            <a:schemeClr val="accent3"/>
-          </a:fillRef>
-          <a:effectRef idx="0">
-            <a:schemeClr val="accent3"/>
-          </a:effectRef>
-          <a:fontRef idx="minor">
-            <a:schemeClr val="lt1"/>
-          </a:fontRef>
-        </p:style>
-        <p:txBody>
-          <a:bodyPr rtlCol="0" anchor="ctr"/>
-          <a:lstStyle/>
-          <a:p>
-            <a:pPr algn="ctr"/>
-            <a:r>
-              <a:rPr lang="de-DE" sz="1400" dirty="0"/>
-              <a:t>Evaluation</a:t>
-            </a:r>
-          </a:p>
-        </p:txBody>
-      </p:sp>
-      <p:sp>
-        <p:nvSpPr>
-          <p:cNvPr id="26" name="Rechteck: abgerundete Ecken 25">
-            <a:extLst>
-              <a:ext uri="{FF2B5EF4-FFF2-40B4-BE49-F238E27FC236}">
-                <a16:creationId xmlns:a16="http://schemas.microsoft.com/office/drawing/2014/main" id="{74434370-EFC9-4C0C-86FC-43740A472B8F}"/>
-              </a:ext>
-            </a:extLst>
-          </p:cNvPr>
-          <p:cNvSpPr/>
-          <p:nvPr/>
-        </p:nvSpPr>
-        <p:spPr>
-          <a:xfrm>
-            <a:off x="6948264" y="3142655"/>
-            <a:ext cx="792088" cy="438800"/>
-          </a:xfrm>
-          <a:prstGeom prst="roundRect">
-            <a:avLst/>
-          </a:prstGeom>
-        </p:spPr>
-        <p:style>
-          <a:lnRef idx="2">
-            <a:schemeClr val="accent3">
-              <a:shade val="50000"/>
-            </a:schemeClr>
-          </a:lnRef>
-          <a:fillRef idx="1">
-            <a:schemeClr val="accent3"/>
-          </a:fillRef>
-          <a:effectRef idx="0">
-            <a:schemeClr val="accent3"/>
-          </a:effectRef>
-          <a:fontRef idx="minor">
-            <a:schemeClr val="lt1"/>
-          </a:fontRef>
-        </p:style>
-        <p:txBody>
-          <a:bodyPr rtlCol="0" anchor="ctr"/>
-          <a:lstStyle/>
-          <a:p>
-            <a:pPr algn="ctr"/>
-            <a:r>
-              <a:rPr lang="de-DE" sz="1400" dirty="0"/>
-              <a:t>Study</a:t>
-            </a:r>
-          </a:p>
-        </p:txBody>
-      </p:sp>
-      <p:cxnSp>
-        <p:nvCxnSpPr>
-          <p:cNvPr id="28" name="Gerade Verbindung mit Pfeil 27">
-            <a:extLst>
-              <a:ext uri="{FF2B5EF4-FFF2-40B4-BE49-F238E27FC236}">
-                <a16:creationId xmlns:a16="http://schemas.microsoft.com/office/drawing/2014/main" id="{81408192-97C6-4204-9E83-973F106390BC}"/>
+                <a16:creationId xmlns:a16="http://schemas.microsoft.com/office/drawing/2014/main" id="{E325F899-EC86-4FB7-89F4-B70680F026A3}"/>
               </a:ext>
             </a:extLst>
           </p:cNvPr>
           <p:cNvCxnSpPr>
-            <a:stCxn id="13" idx="2"/>
-            <a:endCxn id="25" idx="0"/>
+            <a:stCxn id="5" idx="0"/>
+            <a:endCxn id="7" idx="0"/>
+          </p:cNvCxnSpPr>
+          <p:nvPr/>
+        </p:nvCxnSpPr>
+        <p:spPr>
+          <a:xfrm rot="5400000" flipH="1" flipV="1">
+            <a:off x="3959932" y="-27384"/>
+            <a:ext cx="12700" cy="5184576"/>
+          </a:xfrm>
+          <a:prstGeom prst="bentConnector3">
+            <a:avLst>
+              <a:gd name="adj1" fmla="val 1800000"/>
+            </a:avLst>
+          </a:prstGeom>
+          <a:ln>
+            <a:tailEnd type="triangle"/>
+          </a:ln>
+        </p:spPr>
+        <p:style>
+          <a:lnRef idx="2">
+            <a:schemeClr val="accent1"/>
+          </a:lnRef>
+          <a:fillRef idx="0">
+            <a:schemeClr val="accent1"/>
+          </a:fillRef>
+          <a:effectRef idx="1">
+            <a:schemeClr val="accent1"/>
+          </a:effectRef>
+          <a:fontRef idx="minor">
+            <a:schemeClr val="tx1"/>
+          </a:fontRef>
+        </p:style>
+      </p:cxnSp>
+      <p:cxnSp>
+        <p:nvCxnSpPr>
+          <p:cNvPr id="14" name="Gerade Verbindung mit Pfeil 13">
+            <a:extLst>
+              <a:ext uri="{FF2B5EF4-FFF2-40B4-BE49-F238E27FC236}">
+                <a16:creationId xmlns:a16="http://schemas.microsoft.com/office/drawing/2014/main" id="{7E99B175-02E9-4C2B-9B75-12779E4E560D}"/>
+              </a:ext>
+            </a:extLst>
+          </p:cNvPr>
+          <p:cNvCxnSpPr>
+            <a:stCxn id="5" idx="3"/>
+            <a:endCxn id="6" idx="1"/>
           </p:cNvCxnSpPr>
           <p:nvPr/>
         </p:nvCxnSpPr>
         <p:spPr>
           <a:xfrm>
-            <a:off x="5966809" y="2859688"/>
-            <a:ext cx="0" cy="282967"/>
+            <a:off x="2267744" y="2816932"/>
+            <a:ext cx="792088" cy="0"/>
           </a:xfrm>
           <a:prstGeom prst="straightConnector1">
             <a:avLst/>
@@ -4271,13 +4045,13 @@
         </p:spPr>
         <p:style>
           <a:lnRef idx="2">
-            <a:schemeClr val="accent3"/>
+            <a:schemeClr val="accent2"/>
           </a:lnRef>
           <a:fillRef idx="0">
-            <a:schemeClr val="accent3"/>
+            <a:schemeClr val="accent2"/>
           </a:fillRef>
           <a:effectRef idx="1">
-            <a:schemeClr val="accent3"/>
+            <a:schemeClr val="accent2"/>
           </a:effectRef>
           <a:fontRef idx="minor">
             <a:schemeClr val="tx1"/>
@@ -4286,23 +4060,23 @@
       </p:cxnSp>
       <p:cxnSp>
         <p:nvCxnSpPr>
-          <p:cNvPr id="30" name="Gerade Verbindung mit Pfeil 29">
+          <p:cNvPr id="16" name="Gerade Verbindung mit Pfeil 15">
             <a:extLst>
               <a:ext uri="{FF2B5EF4-FFF2-40B4-BE49-F238E27FC236}">
-                <a16:creationId xmlns:a16="http://schemas.microsoft.com/office/drawing/2014/main" id="{9B8FFA09-63E9-4482-A48E-83152815CCD2}"/>
+                <a16:creationId xmlns:a16="http://schemas.microsoft.com/office/drawing/2014/main" id="{D124C16B-FA65-4901-8C8E-0635A4C34BB6}"/>
               </a:ext>
             </a:extLst>
           </p:cNvPr>
           <p:cNvCxnSpPr>
-            <a:stCxn id="25" idx="1"/>
-            <a:endCxn id="23" idx="3"/>
+            <a:stCxn id="6" idx="2"/>
+            <a:endCxn id="8" idx="0"/>
           </p:cNvCxnSpPr>
           <p:nvPr/>
         </p:nvCxnSpPr>
         <p:spPr>
-          <a:xfrm flipH="1">
-            <a:off x="4932040" y="3362055"/>
-            <a:ext cx="483582" cy="502369"/>
+          <a:xfrm>
+            <a:off x="3959932" y="3068960"/>
+            <a:ext cx="0" cy="506464"/>
           </a:xfrm>
           <a:prstGeom prst="straightConnector1">
             <a:avLst/>
@@ -4313,13 +4087,13 @@
         </p:spPr>
         <p:style>
           <a:lnRef idx="2">
-            <a:schemeClr val="accent3"/>
+            <a:schemeClr val="accent2"/>
           </a:lnRef>
           <a:fillRef idx="0">
-            <a:schemeClr val="accent3"/>
+            <a:schemeClr val="accent2"/>
           </a:fillRef>
           <a:effectRef idx="1">
-            <a:schemeClr val="accent3"/>
+            <a:schemeClr val="accent2"/>
           </a:effectRef>
           <a:fontRef idx="minor">
             <a:schemeClr val="tx1"/>
@@ -4328,25 +4102,25 @@
       </p:cxnSp>
       <p:cxnSp>
         <p:nvCxnSpPr>
-          <p:cNvPr id="32" name="Gerade Verbindung mit Pfeil 31">
+          <p:cNvPr id="20" name="Verbinder: gewinkelt 19">
             <a:extLst>
               <a:ext uri="{FF2B5EF4-FFF2-40B4-BE49-F238E27FC236}">
-                <a16:creationId xmlns:a16="http://schemas.microsoft.com/office/drawing/2014/main" id="{C52D6F92-6AFD-4151-B30A-D6F18313F967}"/>
+                <a16:creationId xmlns:a16="http://schemas.microsoft.com/office/drawing/2014/main" id="{144A7997-4F4C-4786-AB92-E3EA9E59EC5A}"/>
               </a:ext>
             </a:extLst>
           </p:cNvPr>
           <p:cNvCxnSpPr>
-            <a:stCxn id="25" idx="3"/>
-            <a:endCxn id="26" idx="1"/>
+            <a:stCxn id="8" idx="3"/>
+            <a:endCxn id="7" idx="2"/>
           </p:cNvCxnSpPr>
           <p:nvPr/>
         </p:nvCxnSpPr>
         <p:spPr>
-          <a:xfrm>
-            <a:off x="6517995" y="3362055"/>
-            <a:ext cx="430269" cy="0"/>
+          <a:xfrm flipV="1">
+            <a:off x="4860032" y="3068960"/>
+            <a:ext cx="1692188" cy="758492"/>
           </a:xfrm>
-          <a:prstGeom prst="straightConnector1">
+          <a:prstGeom prst="bentConnector2">
             <a:avLst/>
           </a:prstGeom>
           <a:ln>
@@ -4355,13 +4129,13 @@
         </p:spPr>
         <p:style>
           <a:lnRef idx="2">
-            <a:schemeClr val="accent3"/>
+            <a:schemeClr val="accent2"/>
           </a:lnRef>
           <a:fillRef idx="0">
-            <a:schemeClr val="accent3"/>
+            <a:schemeClr val="accent2"/>
           </a:fillRef>
           <a:effectRef idx="1">
-            <a:schemeClr val="accent3"/>
+            <a:schemeClr val="accent2"/>
           </a:effectRef>
           <a:fontRef idx="minor">
             <a:schemeClr val="tx1"/>
@@ -4370,10 +4144,10 @@
       </p:cxnSp>
       <p:sp>
         <p:nvSpPr>
-          <p:cNvPr id="33" name="Textfeld 32">
+          <p:cNvPr id="21" name="Textfeld 20">
             <a:extLst>
               <a:ext uri="{FF2B5EF4-FFF2-40B4-BE49-F238E27FC236}">
-                <a16:creationId xmlns:a16="http://schemas.microsoft.com/office/drawing/2014/main" id="{60798814-5BA7-4C6B-A8BB-76F2D1891C3C}"/>
+                <a16:creationId xmlns:a16="http://schemas.microsoft.com/office/drawing/2014/main" id="{CD94B4BF-4515-4E60-8614-646C0985A65B}"/>
               </a:ext>
             </a:extLst>
           </p:cNvPr>
@@ -4382,8 +4156,8 @@
         </p:nvSpPr>
         <p:spPr>
           <a:xfrm>
-            <a:off x="2123730" y="4554409"/>
-            <a:ext cx="5040556" cy="646331"/>
+            <a:off x="683568" y="4827819"/>
+            <a:ext cx="7188200" cy="1200329"/>
           </a:xfrm>
           <a:prstGeom prst="rect">
             <a:avLst/>
@@ -4401,6 +4175,40 @@
               <a:buChar char="•"/>
             </a:pPr>
             <a:r>
+              <a:rPr lang="de-DE" dirty="0"/>
+              <a:t>Research </a:t>
+            </a:r>
+            <a:r>
+              <a:rPr lang="de-DE" dirty="0" err="1"/>
+              <a:t>question</a:t>
+            </a:r>
+            <a:r>
+              <a:rPr lang="de-DE" dirty="0"/>
+              <a:t> </a:t>
+            </a:r>
+            <a:r>
+              <a:rPr lang="de-DE" dirty="0" err="1"/>
+              <a:t>boils</a:t>
+            </a:r>
+            <a:r>
+              <a:rPr lang="de-DE" dirty="0"/>
+              <a:t> down </a:t>
+            </a:r>
+            <a:r>
+              <a:rPr lang="de-DE" dirty="0" err="1"/>
+              <a:t>to</a:t>
+            </a:r>
+            <a:r>
+              <a:rPr lang="de-DE" dirty="0"/>
+              <a:t>: </a:t>
+            </a:r>
+          </a:p>
+          <a:p>
+            <a:pPr marL="742950" lvl="1" indent="-285750">
+              <a:buFont typeface="Arial" panose="020B0604020202020204" pitchFamily="34" charset="0"/>
+              <a:buChar char="•"/>
+            </a:pPr>
+            <a:r>
               <a:rPr lang="de-DE" dirty="0" err="1"/>
               <a:t>Is</a:t>
             </a:r>
@@ -4414,7 +4222,15 @@
             </a:r>
             <a:r>
               <a:rPr lang="de-DE" dirty="0"/>
-              <a:t> possible to design a TF via DRL to </a:t>
+              <a:t> possible </a:t>
+            </a:r>
+            <a:r>
+              <a:rPr lang="de-DE" dirty="0" err="1"/>
+              <a:t>to</a:t>
+            </a:r>
+            <a:r>
+              <a:rPr lang="de-DE" dirty="0"/>
+              <a:t> </a:t>
             </a:r>
             <a:r>
               <a:rPr lang="de-DE" dirty="0" err="1"/>
@@ -4422,7 +4238,7 @@
             </a:r>
             <a:r>
               <a:rPr lang="de-DE" dirty="0"/>
-              <a:t> UX and </a:t>
+              <a:t> </a:t>
             </a:r>
             <a:r>
               <a:rPr lang="de-DE" dirty="0" err="1"/>
@@ -4438,11 +4254,11 @@
             </a:r>
             <a:r>
               <a:rPr lang="de-DE" dirty="0"/>
-              <a:t> in </a:t>
-            </a:r>
-            <a:r>
-              <a:rPr lang="de-DE" dirty="0" err="1"/>
-              <a:t>certain</a:t>
+              <a:t>/ </a:t>
+            </a:r>
+            <a:r>
+              <a:rPr lang="de-DE" dirty="0" err="1"/>
+              <a:t>immersion</a:t>
             </a:r>
             <a:r>
               <a:rPr lang="de-DE" dirty="0"/>
@@ -4450,19 +4266,62 @@
             </a:r>
             <a:r>
               <a:rPr lang="de-DE" dirty="0" err="1"/>
-              <a:t>tasks</a:t>
-            </a:r>
-            <a:r>
-              <a:rPr lang="de-DE" dirty="0"/>
-              <a:t>?</a:t>
-            </a:r>
+              <a:t>by</a:t>
+            </a:r>
+            <a:r>
+              <a:rPr lang="de-DE" dirty="0"/>
+              <a:t> </a:t>
+            </a:r>
+            <a:r>
+              <a:rPr lang="de-DE" dirty="0" err="1"/>
+              <a:t>prediciting</a:t>
+            </a:r>
+            <a:r>
+              <a:rPr lang="de-DE" dirty="0"/>
+              <a:t> </a:t>
+            </a:r>
+            <a:r>
+              <a:rPr lang="de-DE" dirty="0" err="1"/>
+              <a:t>movement</a:t>
+            </a:r>
+            <a:r>
+              <a:rPr lang="de-DE" dirty="0"/>
+              <a:t> </a:t>
+            </a:r>
+            <a:r>
+              <a:rPr lang="de-DE" dirty="0" err="1"/>
+              <a:t>using</a:t>
+            </a:r>
+            <a:r>
+              <a:rPr lang="de-DE" dirty="0"/>
+              <a:t> NN? </a:t>
+            </a:r>
+          </a:p>
+          <a:p>
+            <a:pPr marL="742950" lvl="1" indent="-285750">
+              <a:buFont typeface="Arial" panose="020B0604020202020204" pitchFamily="34" charset="0"/>
+              <a:buChar char="•"/>
+            </a:pPr>
+            <a:r>
+              <a:rPr lang="de-DE" dirty="0" err="1"/>
+              <a:t>Quantify</a:t>
+            </a:r>
+            <a:r>
+              <a:rPr lang="de-DE" dirty="0"/>
+              <a:t> </a:t>
+            </a:r>
+            <a:r>
+              <a:rPr lang="de-DE" dirty="0" err="1"/>
+              <a:t>it!</a:t>
+            </a:r>
+            <a:endParaRPr lang="de-DE" dirty="0"/>
           </a:p>
         </p:txBody>
       </p:sp>
     </p:spTree>
     <p:extLst>
       <p:ext uri="{BB962C8B-B14F-4D97-AF65-F5344CB8AC3E}">
-        <p14:creationId xmlns:p14="http://schemas.microsoft.com/office/powerpoint/2010/main" val="2853724498"/>
+        <p14:creationId xmlns:p14="http://schemas.microsoft.com/office/powerpoint/2010/main" val="3388330645"/>
       </p:ext>
     </p:extLst>
   </p:cSld>

</xml_diff>